<commit_message>
Add "Blockschaltbild" to powerpoint
</commit_message>
<xml_diff>
--- a/Vorstellung.pptx
+++ b/Vorstellung.pptx
@@ -124,702 +124,6 @@
     <p1510:client id="{62AFA320-9B9E-4927-8852-63FFD396E194}" v="17" dt="2024-12-17T08:42:27.887"/>
   </p1510:revLst>
 </p1510:revInfo>
-</file>
-
-<file path=ppt/changesInfos/changesInfo1.xml><?xml version="1.0" encoding="utf-8"?>
-<pc:chgInfo xmlns:a="http://schemas.openxmlformats.org/drawingml/2006/main" xmlns:r="http://schemas.openxmlformats.org/officeDocument/2006/relationships" xmlns:ac="http://schemas.microsoft.com/office/drawing/2013/main/command" xmlns:pc="http://schemas.microsoft.com/office/powerpoint/2013/main/command">
-  <pc:docChgLst>
-    <pc:chgData name="Schranzhofer Daniel Benjamin" userId="896aed5a-a90e-49ae-b044-096ef6952a5d" providerId="ADAL" clId="{62AFA320-9B9E-4927-8852-63FFD396E194}"/>
-    <pc:docChg chg="undo redo custSel addSld delSld modSld sldOrd">
-      <pc:chgData name="Schranzhofer Daniel Benjamin" userId="896aed5a-a90e-49ae-b044-096ef6952a5d" providerId="ADAL" clId="{62AFA320-9B9E-4927-8852-63FFD396E194}" dt="2024-12-17T09:02:34.088" v="1795" actId="20577"/>
-      <pc:docMkLst>
-        <pc:docMk/>
-      </pc:docMkLst>
-      <pc:sldChg chg="addSp delSp modSp mod ord modClrScheme chgLayout">
-        <pc:chgData name="Schranzhofer Daniel Benjamin" userId="896aed5a-a90e-49ae-b044-096ef6952a5d" providerId="ADAL" clId="{62AFA320-9B9E-4927-8852-63FFD396E194}" dt="2024-12-17T08:37:11.582" v="1548" actId="20577"/>
-        <pc:sldMkLst>
-          <pc:docMk/>
-          <pc:sldMk cId="61744048" sldId="256"/>
-        </pc:sldMkLst>
-        <pc:spChg chg="del mod ord">
-          <ac:chgData name="Schranzhofer Daniel Benjamin" userId="896aed5a-a90e-49ae-b044-096ef6952a5d" providerId="ADAL" clId="{62AFA320-9B9E-4927-8852-63FFD396E194}" dt="2024-12-17T07:18:28.925" v="26" actId="700"/>
-          <ac:spMkLst>
-            <pc:docMk/>
-            <pc:sldMk cId="61744048" sldId="256"/>
-            <ac:spMk id="2" creationId="{99985D14-CE2E-30E5-0949-C52F0956F5DC}"/>
-          </ac:spMkLst>
-        </pc:spChg>
-        <pc:spChg chg="del mod ord">
-          <ac:chgData name="Schranzhofer Daniel Benjamin" userId="896aed5a-a90e-49ae-b044-096ef6952a5d" providerId="ADAL" clId="{62AFA320-9B9E-4927-8852-63FFD396E194}" dt="2024-12-17T07:18:28.925" v="26" actId="700"/>
-          <ac:spMkLst>
-            <pc:docMk/>
-            <pc:sldMk cId="61744048" sldId="256"/>
-            <ac:spMk id="3" creationId="{BE07EFA6-4638-E89A-219A-7B5CAE6C4D15}"/>
-          </ac:spMkLst>
-        </pc:spChg>
-        <pc:spChg chg="add del mod ord">
-          <ac:chgData name="Schranzhofer Daniel Benjamin" userId="896aed5a-a90e-49ae-b044-096ef6952a5d" providerId="ADAL" clId="{62AFA320-9B9E-4927-8852-63FFD396E194}" dt="2024-12-17T07:46:10.391" v="700" actId="478"/>
-          <ac:spMkLst>
-            <pc:docMk/>
-            <pc:sldMk cId="61744048" sldId="256"/>
-            <ac:spMk id="4" creationId="{6CE32E54-89B3-3BEB-59F8-8608750B0B2D}"/>
-          </ac:spMkLst>
-        </pc:spChg>
-        <pc:spChg chg="add del mod ord">
-          <ac:chgData name="Schranzhofer Daniel Benjamin" userId="896aed5a-a90e-49ae-b044-096ef6952a5d" providerId="ADAL" clId="{62AFA320-9B9E-4927-8852-63FFD396E194}" dt="2024-12-17T07:32:51.988" v="311" actId="700"/>
-          <ac:spMkLst>
-            <pc:docMk/>
-            <pc:sldMk cId="61744048" sldId="256"/>
-            <ac:spMk id="5" creationId="{CCA2927E-44DE-AE6E-BBE0-C4AB5BD6DF1D}"/>
-          </ac:spMkLst>
-        </pc:spChg>
-        <pc:spChg chg="add del mod ord">
-          <ac:chgData name="Schranzhofer Daniel Benjamin" userId="896aed5a-a90e-49ae-b044-096ef6952a5d" providerId="ADAL" clId="{62AFA320-9B9E-4927-8852-63FFD396E194}" dt="2024-12-17T07:46:08.492" v="699" actId="478"/>
-          <ac:spMkLst>
-            <pc:docMk/>
-            <pc:sldMk cId="61744048" sldId="256"/>
-            <ac:spMk id="6" creationId="{01B9E23E-F564-968F-88F0-080B44EE3D6D}"/>
-          </ac:spMkLst>
-        </pc:spChg>
-        <pc:spChg chg="add del mod ord">
-          <ac:chgData name="Schranzhofer Daniel Benjamin" userId="896aed5a-a90e-49ae-b044-096ef6952a5d" providerId="ADAL" clId="{62AFA320-9B9E-4927-8852-63FFD396E194}" dt="2024-12-17T07:35:16.899" v="478" actId="478"/>
-          <ac:spMkLst>
-            <pc:docMk/>
-            <pc:sldMk cId="61744048" sldId="256"/>
-            <ac:spMk id="7" creationId="{F4B6EBD3-8450-94E4-AFCD-17264605E71A}"/>
-          </ac:spMkLst>
-        </pc:spChg>
-        <pc:spChg chg="del">
-          <ac:chgData name="Schranzhofer Daniel Benjamin" userId="896aed5a-a90e-49ae-b044-096ef6952a5d" providerId="ADAL" clId="{62AFA320-9B9E-4927-8852-63FFD396E194}" dt="2024-12-17T07:46:10.391" v="700" actId="478"/>
-          <ac:spMkLst>
-            <pc:docMk/>
-            <pc:sldMk cId="61744048" sldId="256"/>
-            <ac:spMk id="8" creationId="{E1A2D20D-7C3C-7D71-4622-36796DD29BF7}"/>
-          </ac:spMkLst>
-        </pc:spChg>
-        <pc:spChg chg="del">
-          <ac:chgData name="Schranzhofer Daniel Benjamin" userId="896aed5a-a90e-49ae-b044-096ef6952a5d" providerId="ADAL" clId="{62AFA320-9B9E-4927-8852-63FFD396E194}" dt="2024-12-17T07:46:10.391" v="700" actId="478"/>
-          <ac:spMkLst>
-            <pc:docMk/>
-            <pc:sldMk cId="61744048" sldId="256"/>
-            <ac:spMk id="9" creationId="{4A2B1975-890A-7A47-AB8E-70C811A9B810}"/>
-          </ac:spMkLst>
-        </pc:spChg>
-        <pc:spChg chg="del">
-          <ac:chgData name="Schranzhofer Daniel Benjamin" userId="896aed5a-a90e-49ae-b044-096ef6952a5d" providerId="ADAL" clId="{62AFA320-9B9E-4927-8852-63FFD396E194}" dt="2024-12-17T07:46:10.391" v="700" actId="478"/>
-          <ac:spMkLst>
-            <pc:docMk/>
-            <pc:sldMk cId="61744048" sldId="256"/>
-            <ac:spMk id="10" creationId="{0AAF902A-ED6F-003E-DC4D-D372F54C7600}"/>
-          </ac:spMkLst>
-        </pc:spChg>
-        <pc:spChg chg="del">
-          <ac:chgData name="Schranzhofer Daniel Benjamin" userId="896aed5a-a90e-49ae-b044-096ef6952a5d" providerId="ADAL" clId="{62AFA320-9B9E-4927-8852-63FFD396E194}" dt="2024-12-17T07:46:10.391" v="700" actId="478"/>
-          <ac:spMkLst>
-            <pc:docMk/>
-            <pc:sldMk cId="61744048" sldId="256"/>
-            <ac:spMk id="12" creationId="{8D5B4120-C70F-986C-1AB8-99BDC13B2502}"/>
-          </ac:spMkLst>
-        </pc:spChg>
-        <pc:spChg chg="add del mod">
-          <ac:chgData name="Schranzhofer Daniel Benjamin" userId="896aed5a-a90e-49ae-b044-096ef6952a5d" providerId="ADAL" clId="{62AFA320-9B9E-4927-8852-63FFD396E194}" dt="2024-12-17T07:46:12.561" v="701" actId="478"/>
-          <ac:spMkLst>
-            <pc:docMk/>
-            <pc:sldMk cId="61744048" sldId="256"/>
-            <ac:spMk id="14" creationId="{8908B300-A7AB-4823-6B22-B84E10449B03}"/>
-          </ac:spMkLst>
-        </pc:spChg>
-        <pc:spChg chg="add mod">
-          <ac:chgData name="Schranzhofer Daniel Benjamin" userId="896aed5a-a90e-49ae-b044-096ef6952a5d" providerId="ADAL" clId="{62AFA320-9B9E-4927-8852-63FFD396E194}" dt="2024-12-17T07:46:12.885" v="702"/>
-          <ac:spMkLst>
-            <pc:docMk/>
-            <pc:sldMk cId="61744048" sldId="256"/>
-            <ac:spMk id="15" creationId="{7A31EF79-59DA-D68A-A542-0252D688B018}"/>
-          </ac:spMkLst>
-        </pc:spChg>
-        <pc:spChg chg="add mod">
-          <ac:chgData name="Schranzhofer Daniel Benjamin" userId="896aed5a-a90e-49ae-b044-096ef6952a5d" providerId="ADAL" clId="{62AFA320-9B9E-4927-8852-63FFD396E194}" dt="2024-12-17T07:46:17.284" v="708" actId="20577"/>
-          <ac:spMkLst>
-            <pc:docMk/>
-            <pc:sldMk cId="61744048" sldId="256"/>
-            <ac:spMk id="16" creationId="{26DAC35D-FA00-FB83-1572-CE21B0142A8C}"/>
-          </ac:spMkLst>
-        </pc:spChg>
-        <pc:spChg chg="add mod">
-          <ac:chgData name="Schranzhofer Daniel Benjamin" userId="896aed5a-a90e-49ae-b044-096ef6952a5d" providerId="ADAL" clId="{62AFA320-9B9E-4927-8852-63FFD396E194}" dt="2024-12-17T07:49:02.032" v="769" actId="20577"/>
-          <ac:spMkLst>
-            <pc:docMk/>
-            <pc:sldMk cId="61744048" sldId="256"/>
-            <ac:spMk id="17" creationId="{31F6B00F-72B9-3F4B-BC8C-8BBAB035F0B1}"/>
-          </ac:spMkLst>
-        </pc:spChg>
-        <pc:spChg chg="add mod">
-          <ac:chgData name="Schranzhofer Daniel Benjamin" userId="896aed5a-a90e-49ae-b044-096ef6952a5d" providerId="ADAL" clId="{62AFA320-9B9E-4927-8852-63FFD396E194}" dt="2024-12-17T08:37:11.582" v="1548" actId="20577"/>
-          <ac:spMkLst>
-            <pc:docMk/>
-            <pc:sldMk cId="61744048" sldId="256"/>
-            <ac:spMk id="19" creationId="{961C55BD-6B58-EBB9-BCBB-080AE4A18C36}"/>
-          </ac:spMkLst>
-        </pc:spChg>
-        <pc:spChg chg="mod">
-          <ac:chgData name="Schranzhofer Daniel Benjamin" userId="896aed5a-a90e-49ae-b044-096ef6952a5d" providerId="ADAL" clId="{62AFA320-9B9E-4927-8852-63FFD396E194}" dt="2024-12-17T07:46:23.842" v="709"/>
-          <ac:spMkLst>
-            <pc:docMk/>
-            <pc:sldMk cId="61744048" sldId="256"/>
-            <ac:spMk id="21" creationId="{801914E6-C55F-934F-D5D8-8E973249880B}"/>
-          </ac:spMkLst>
-        </pc:spChg>
-        <pc:spChg chg="mod">
-          <ac:chgData name="Schranzhofer Daniel Benjamin" userId="896aed5a-a90e-49ae-b044-096ef6952a5d" providerId="ADAL" clId="{62AFA320-9B9E-4927-8852-63FFD396E194}" dt="2024-12-17T07:46:23.842" v="709"/>
-          <ac:spMkLst>
-            <pc:docMk/>
-            <pc:sldMk cId="61744048" sldId="256"/>
-            <ac:spMk id="22" creationId="{8ED2B74A-BFDD-B153-BF71-1CD2BA52A880}"/>
-          </ac:spMkLst>
-        </pc:spChg>
-        <pc:cxnChg chg="del">
-          <ac:chgData name="Schranzhofer Daniel Benjamin" userId="896aed5a-a90e-49ae-b044-096ef6952a5d" providerId="ADAL" clId="{62AFA320-9B9E-4927-8852-63FFD396E194}" dt="2024-12-17T07:46:10.391" v="700" actId="478"/>
-          <ac:cxnSpMkLst>
-            <pc:docMk/>
-            <pc:sldMk cId="61744048" sldId="256"/>
-            <ac:cxnSpMk id="11" creationId="{73067B83-0A70-CF9F-0BBD-331E99C81966}"/>
-          </ac:cxnSpMkLst>
-        </pc:cxnChg>
-        <pc:cxnChg chg="add mod">
-          <ac:chgData name="Schranzhofer Daniel Benjamin" userId="896aed5a-a90e-49ae-b044-096ef6952a5d" providerId="ADAL" clId="{62AFA320-9B9E-4927-8852-63FFD396E194}" dt="2024-12-17T07:46:12.885" v="702"/>
-          <ac:cxnSpMkLst>
-            <pc:docMk/>
-            <pc:sldMk cId="61744048" sldId="256"/>
-            <ac:cxnSpMk id="18" creationId="{E7D65A43-0D16-FB60-06D7-D8A3134FC8E6}"/>
-          </ac:cxnSpMkLst>
-        </pc:cxnChg>
-      </pc:sldChg>
-      <pc:sldChg chg="addSp delSp modSp new mod ord setBg">
-        <pc:chgData name="Schranzhofer Daniel Benjamin" userId="896aed5a-a90e-49ae-b044-096ef6952a5d" providerId="ADAL" clId="{62AFA320-9B9E-4927-8852-63FFD396E194}" dt="2024-12-17T07:49:39.553" v="773" actId="26606"/>
-        <pc:sldMkLst>
-          <pc:docMk/>
-          <pc:sldMk cId="1021443358" sldId="257"/>
-        </pc:sldMkLst>
-        <pc:spChg chg="mod">
-          <ac:chgData name="Schranzhofer Daniel Benjamin" userId="896aed5a-a90e-49ae-b044-096ef6952a5d" providerId="ADAL" clId="{62AFA320-9B9E-4927-8852-63FFD396E194}" dt="2024-12-17T07:49:39.553" v="773" actId="26606"/>
-          <ac:spMkLst>
-            <pc:docMk/>
-            <pc:sldMk cId="1021443358" sldId="257"/>
-            <ac:spMk id="2" creationId="{3C4242E6-FB36-47B5-3312-2CF1F955B0B7}"/>
-          </ac:spMkLst>
-        </pc:spChg>
-        <pc:spChg chg="add del">
-          <ac:chgData name="Schranzhofer Daniel Benjamin" userId="896aed5a-a90e-49ae-b044-096ef6952a5d" providerId="ADAL" clId="{62AFA320-9B9E-4927-8852-63FFD396E194}" dt="2024-12-17T07:49:39.553" v="773" actId="26606"/>
-          <ac:spMkLst>
-            <pc:docMk/>
-            <pc:sldMk cId="1021443358" sldId="257"/>
-            <ac:spMk id="7" creationId="{943CAA20-3569-4189-9E48-239A229A86CA}"/>
-          </ac:spMkLst>
-        </pc:spChg>
-        <pc:spChg chg="add del">
-          <ac:chgData name="Schranzhofer Daniel Benjamin" userId="896aed5a-a90e-49ae-b044-096ef6952a5d" providerId="ADAL" clId="{62AFA320-9B9E-4927-8852-63FFD396E194}" dt="2024-12-17T07:49:39.553" v="773" actId="26606"/>
-          <ac:spMkLst>
-            <pc:docMk/>
-            <pc:sldMk cId="1021443358" sldId="257"/>
-            <ac:spMk id="9" creationId="{DA542B6D-E775-4832-91DC-2D20F857813A}"/>
-          </ac:spMkLst>
-        </pc:spChg>
-        <pc:spChg chg="add">
-          <ac:chgData name="Schranzhofer Daniel Benjamin" userId="896aed5a-a90e-49ae-b044-096ef6952a5d" providerId="ADAL" clId="{62AFA320-9B9E-4927-8852-63FFD396E194}" dt="2024-12-17T07:49:39.553" v="773" actId="26606"/>
-          <ac:spMkLst>
-            <pc:docMk/>
-            <pc:sldMk cId="1021443358" sldId="257"/>
-            <ac:spMk id="14" creationId="{5A292AEA-2528-46C0-B426-95822B6141FB}"/>
-          </ac:spMkLst>
-        </pc:spChg>
-        <pc:spChg chg="add">
-          <ac:chgData name="Schranzhofer Daniel Benjamin" userId="896aed5a-a90e-49ae-b044-096ef6952a5d" providerId="ADAL" clId="{62AFA320-9B9E-4927-8852-63FFD396E194}" dt="2024-12-17T07:49:39.553" v="773" actId="26606"/>
-          <ac:spMkLst>
-            <pc:docMk/>
-            <pc:sldMk cId="1021443358" sldId="257"/>
-            <ac:spMk id="16" creationId="{D8B7B198-E4DF-43CD-AD8C-199884323745}"/>
-          </ac:spMkLst>
-        </pc:spChg>
-        <pc:spChg chg="add">
-          <ac:chgData name="Schranzhofer Daniel Benjamin" userId="896aed5a-a90e-49ae-b044-096ef6952a5d" providerId="ADAL" clId="{62AFA320-9B9E-4927-8852-63FFD396E194}" dt="2024-12-17T07:49:39.553" v="773" actId="26606"/>
-          <ac:spMkLst>
-            <pc:docMk/>
-            <pc:sldMk cId="1021443358" sldId="257"/>
-            <ac:spMk id="18" creationId="{2BE67753-EA0E-4819-8D22-0B6600CF7231}"/>
-          </ac:spMkLst>
-        </pc:spChg>
-        <pc:grpChg chg="add">
-          <ac:chgData name="Schranzhofer Daniel Benjamin" userId="896aed5a-a90e-49ae-b044-096ef6952a5d" providerId="ADAL" clId="{62AFA320-9B9E-4927-8852-63FFD396E194}" dt="2024-12-17T07:49:39.553" v="773" actId="26606"/>
-          <ac:grpSpMkLst>
-            <pc:docMk/>
-            <pc:sldMk cId="1021443358" sldId="257"/>
-            <ac:grpSpMk id="20" creationId="{D76D63AC-0421-45EC-B383-E79A61A78C6B}"/>
-          </ac:grpSpMkLst>
-        </pc:grpChg>
-        <pc:grpChg chg="add">
-          <ac:chgData name="Schranzhofer Daniel Benjamin" userId="896aed5a-a90e-49ae-b044-096ef6952a5d" providerId="ADAL" clId="{62AFA320-9B9E-4927-8852-63FFD396E194}" dt="2024-12-17T07:49:39.553" v="773" actId="26606"/>
-          <ac:grpSpMkLst>
-            <pc:docMk/>
-            <pc:sldMk cId="1021443358" sldId="257"/>
-            <ac:grpSpMk id="29" creationId="{87F87F1B-42BA-4AC7-A4E2-41544DDB2CE3}"/>
-          </ac:grpSpMkLst>
-        </pc:grpChg>
-        <pc:grpChg chg="add">
-          <ac:chgData name="Schranzhofer Daniel Benjamin" userId="896aed5a-a90e-49ae-b044-096ef6952a5d" providerId="ADAL" clId="{62AFA320-9B9E-4927-8852-63FFD396E194}" dt="2024-12-17T07:49:39.553" v="773" actId="26606"/>
-          <ac:grpSpMkLst>
-            <pc:docMk/>
-            <pc:sldMk cId="1021443358" sldId="257"/>
-            <ac:grpSpMk id="35" creationId="{967346A5-7569-4F15-AB5D-BE3DADF192C0}"/>
-          </ac:grpSpMkLst>
-        </pc:grpChg>
-      </pc:sldChg>
-      <pc:sldChg chg="addSp modSp add del mod setBg modClrScheme chgLayout">
-        <pc:chgData name="Schranzhofer Daniel Benjamin" userId="896aed5a-a90e-49ae-b044-096ef6952a5d" providerId="ADAL" clId="{62AFA320-9B9E-4927-8852-63FFD396E194}" dt="2024-12-17T09:02:34.088" v="1795" actId="20577"/>
-        <pc:sldMkLst>
-          <pc:docMk/>
-          <pc:sldMk cId="1272570971" sldId="258"/>
-        </pc:sldMkLst>
-        <pc:spChg chg="add mod ord">
-          <ac:chgData name="Schranzhofer Daniel Benjamin" userId="896aed5a-a90e-49ae-b044-096ef6952a5d" providerId="ADAL" clId="{62AFA320-9B9E-4927-8852-63FFD396E194}" dt="2024-12-17T07:48:24.582" v="747" actId="20577"/>
-          <ac:spMkLst>
-            <pc:docMk/>
-            <pc:sldMk cId="1272570971" sldId="258"/>
-            <ac:spMk id="2" creationId="{77C0FBE6-3A73-32DF-055C-458B34C16060}"/>
-          </ac:spMkLst>
-        </pc:spChg>
-        <pc:spChg chg="add mod">
-          <ac:chgData name="Schranzhofer Daniel Benjamin" userId="896aed5a-a90e-49ae-b044-096ef6952a5d" providerId="ADAL" clId="{62AFA320-9B9E-4927-8852-63FFD396E194}" dt="2024-12-17T09:02:34.088" v="1795" actId="20577"/>
-          <ac:spMkLst>
-            <pc:docMk/>
-            <pc:sldMk cId="1272570971" sldId="258"/>
-            <ac:spMk id="3" creationId="{E9627B73-AD5A-D4AD-79E2-410C2663C736}"/>
-          </ac:spMkLst>
-        </pc:spChg>
-        <pc:spChg chg="mod ord">
-          <ac:chgData name="Schranzhofer Daniel Benjamin" userId="896aed5a-a90e-49ae-b044-096ef6952a5d" providerId="ADAL" clId="{62AFA320-9B9E-4927-8852-63FFD396E194}" dt="2024-12-17T07:44:27.211" v="655" actId="122"/>
-          <ac:spMkLst>
-            <pc:docMk/>
-            <pc:sldMk cId="1272570971" sldId="258"/>
-            <ac:spMk id="4" creationId="{69B80579-79A6-46E9-6667-09624969B3DA}"/>
-          </ac:spMkLst>
-        </pc:spChg>
-        <pc:spChg chg="mod ord">
-          <ac:chgData name="Schranzhofer Daniel Benjamin" userId="896aed5a-a90e-49ae-b044-096ef6952a5d" providerId="ADAL" clId="{62AFA320-9B9E-4927-8852-63FFD396E194}" dt="2024-12-17T07:48:32.188" v="749" actId="14100"/>
-          <ac:spMkLst>
-            <pc:docMk/>
-            <pc:sldMk cId="1272570971" sldId="258"/>
-            <ac:spMk id="5" creationId="{D8DC8B67-1785-E6E1-D308-DCC85BFD665C}"/>
-          </ac:spMkLst>
-        </pc:spChg>
-        <pc:spChg chg="add">
-          <ac:chgData name="Schranzhofer Daniel Benjamin" userId="896aed5a-a90e-49ae-b044-096ef6952a5d" providerId="ADAL" clId="{62AFA320-9B9E-4927-8852-63FFD396E194}" dt="2024-12-17T07:44:18.446" v="652" actId="26606"/>
-          <ac:spMkLst>
-            <pc:docMk/>
-            <pc:sldMk cId="1272570971" sldId="258"/>
-            <ac:spMk id="10" creationId="{4C608BEB-860E-4094-8511-78603564A75E}"/>
-          </ac:spMkLst>
-        </pc:spChg>
-        <pc:cxnChg chg="add">
-          <ac:chgData name="Schranzhofer Daniel Benjamin" userId="896aed5a-a90e-49ae-b044-096ef6952a5d" providerId="ADAL" clId="{62AFA320-9B9E-4927-8852-63FFD396E194}" dt="2024-12-17T07:44:18.446" v="652" actId="26606"/>
-          <ac:cxnSpMkLst>
-            <pc:docMk/>
-            <pc:sldMk cId="1272570971" sldId="258"/>
-            <ac:cxnSpMk id="12" creationId="{1F16A8D4-FE87-4604-88B2-394B5D1EB437}"/>
-          </ac:cxnSpMkLst>
-        </pc:cxnChg>
-      </pc:sldChg>
-      <pc:sldChg chg="new del">
-        <pc:chgData name="Schranzhofer Daniel Benjamin" userId="896aed5a-a90e-49ae-b044-096ef6952a5d" providerId="ADAL" clId="{62AFA320-9B9E-4927-8852-63FFD396E194}" dt="2024-12-17T07:18:16.600" v="24" actId="2696"/>
-        <pc:sldMkLst>
-          <pc:docMk/>
-          <pc:sldMk cId="1818520741" sldId="258"/>
-        </pc:sldMkLst>
-      </pc:sldChg>
-      <pc:sldChg chg="new del">
-        <pc:chgData name="Schranzhofer Daniel Benjamin" userId="896aed5a-a90e-49ae-b044-096ef6952a5d" providerId="ADAL" clId="{62AFA320-9B9E-4927-8852-63FFD396E194}" dt="2024-12-17T07:18:20.038" v="25" actId="2696"/>
-        <pc:sldMkLst>
-          <pc:docMk/>
-          <pc:sldMk cId="2624492684" sldId="259"/>
-        </pc:sldMkLst>
-      </pc:sldChg>
-      <pc:sldChg chg="modSp new mod">
-        <pc:chgData name="Schranzhofer Daniel Benjamin" userId="896aed5a-a90e-49ae-b044-096ef6952a5d" providerId="ADAL" clId="{62AFA320-9B9E-4927-8852-63FFD396E194}" dt="2024-12-17T07:43:46.484" v="648" actId="113"/>
-        <pc:sldMkLst>
-          <pc:docMk/>
-          <pc:sldMk cId="3495461466" sldId="259"/>
-        </pc:sldMkLst>
-        <pc:spChg chg="mod">
-          <ac:chgData name="Schranzhofer Daniel Benjamin" userId="896aed5a-a90e-49ae-b044-096ef6952a5d" providerId="ADAL" clId="{62AFA320-9B9E-4927-8852-63FFD396E194}" dt="2024-12-17T07:43:46.484" v="648" actId="113"/>
-          <ac:spMkLst>
-            <pc:docMk/>
-            <pc:sldMk cId="3495461466" sldId="259"/>
-            <ac:spMk id="2" creationId="{75CBCCD9-D2DF-DE01-EC57-3CEF21C37657}"/>
-          </ac:spMkLst>
-        </pc:spChg>
-      </pc:sldChg>
-      <pc:sldChg chg="addSp delSp modSp new mod modClrScheme chgLayout">
-        <pc:chgData name="Schranzhofer Daniel Benjamin" userId="896aed5a-a90e-49ae-b044-096ef6952a5d" providerId="ADAL" clId="{62AFA320-9B9E-4927-8852-63FFD396E194}" dt="2024-12-17T08:37:05.854" v="1547" actId="12"/>
-        <pc:sldMkLst>
-          <pc:docMk/>
-          <pc:sldMk cId="2500380370" sldId="260"/>
-        </pc:sldMkLst>
-        <pc:spChg chg="del mod ord">
-          <ac:chgData name="Schranzhofer Daniel Benjamin" userId="896aed5a-a90e-49ae-b044-096ef6952a5d" providerId="ADAL" clId="{62AFA320-9B9E-4927-8852-63FFD396E194}" dt="2024-12-17T07:35:32.097" v="493" actId="700"/>
-          <ac:spMkLst>
-            <pc:docMk/>
-            <pc:sldMk cId="2500380370" sldId="260"/>
-            <ac:spMk id="2" creationId="{D5B952D4-DB40-13FF-9E5A-031D9675D776}"/>
-          </ac:spMkLst>
-        </pc:spChg>
-        <pc:spChg chg="del mod ord">
-          <ac:chgData name="Schranzhofer Daniel Benjamin" userId="896aed5a-a90e-49ae-b044-096ef6952a5d" providerId="ADAL" clId="{62AFA320-9B9E-4927-8852-63FFD396E194}" dt="2024-12-17T07:35:32.097" v="493" actId="700"/>
-          <ac:spMkLst>
-            <pc:docMk/>
-            <pc:sldMk cId="2500380370" sldId="260"/>
-            <ac:spMk id="3" creationId="{2A3C1548-39C0-2F17-3929-D17B9B283118}"/>
-          </ac:spMkLst>
-        </pc:spChg>
-        <pc:spChg chg="del">
-          <ac:chgData name="Schranzhofer Daniel Benjamin" userId="896aed5a-a90e-49ae-b044-096ef6952a5d" providerId="ADAL" clId="{62AFA320-9B9E-4927-8852-63FFD396E194}" dt="2024-12-17T07:35:32.097" v="493" actId="700"/>
-          <ac:spMkLst>
-            <pc:docMk/>
-            <pc:sldMk cId="2500380370" sldId="260"/>
-            <ac:spMk id="4" creationId="{0775FA73-D2EC-F428-FB01-7B8490A1BA8E}"/>
-          </ac:spMkLst>
-        </pc:spChg>
-        <pc:spChg chg="add del mod ord">
-          <ac:chgData name="Schranzhofer Daniel Benjamin" userId="896aed5a-a90e-49ae-b044-096ef6952a5d" providerId="ADAL" clId="{62AFA320-9B9E-4927-8852-63FFD396E194}" dt="2024-12-17T07:45:33.009" v="670" actId="478"/>
-          <ac:spMkLst>
-            <pc:docMk/>
-            <pc:sldMk cId="2500380370" sldId="260"/>
-            <ac:spMk id="5" creationId="{AD45E7E9-303E-73E3-A3D8-0A0D92C4ADCC}"/>
-          </ac:spMkLst>
-        </pc:spChg>
-        <pc:spChg chg="add del mod ord">
-          <ac:chgData name="Schranzhofer Daniel Benjamin" userId="896aed5a-a90e-49ae-b044-096ef6952a5d" providerId="ADAL" clId="{62AFA320-9B9E-4927-8852-63FFD396E194}" dt="2024-12-17T07:45:33.009" v="670" actId="478"/>
-          <ac:spMkLst>
-            <pc:docMk/>
-            <pc:sldMk cId="2500380370" sldId="260"/>
-            <ac:spMk id="6" creationId="{4D48D931-774F-821B-54AB-3BEBE136ECF2}"/>
-          </ac:spMkLst>
-        </pc:spChg>
-        <pc:spChg chg="add del mod">
-          <ac:chgData name="Schranzhofer Daniel Benjamin" userId="896aed5a-a90e-49ae-b044-096ef6952a5d" providerId="ADAL" clId="{62AFA320-9B9E-4927-8852-63FFD396E194}" dt="2024-12-17T07:45:33.009" v="670" actId="478"/>
-          <ac:spMkLst>
-            <pc:docMk/>
-            <pc:sldMk cId="2500380370" sldId="260"/>
-            <ac:spMk id="7" creationId="{72BE049D-E26E-69E3-1317-FB7AC69A0D58}"/>
-          </ac:spMkLst>
-        </pc:spChg>
-        <pc:spChg chg="add del mod">
-          <ac:chgData name="Schranzhofer Daniel Benjamin" userId="896aed5a-a90e-49ae-b044-096ef6952a5d" providerId="ADAL" clId="{62AFA320-9B9E-4927-8852-63FFD396E194}" dt="2024-12-17T07:45:33.009" v="670" actId="478"/>
-          <ac:spMkLst>
-            <pc:docMk/>
-            <pc:sldMk cId="2500380370" sldId="260"/>
-            <ac:spMk id="8" creationId="{9E936A1B-3FE1-5B5E-AB6D-94E2CF31E606}"/>
-          </ac:spMkLst>
-        </pc:spChg>
-        <pc:spChg chg="add del mod">
-          <ac:chgData name="Schranzhofer Daniel Benjamin" userId="896aed5a-a90e-49ae-b044-096ef6952a5d" providerId="ADAL" clId="{62AFA320-9B9E-4927-8852-63FFD396E194}" dt="2024-12-17T07:45:33.009" v="670" actId="478"/>
-          <ac:spMkLst>
-            <pc:docMk/>
-            <pc:sldMk cId="2500380370" sldId="260"/>
-            <ac:spMk id="9" creationId="{7C965CBE-E471-AA77-1F4D-6113165382E2}"/>
-          </ac:spMkLst>
-        </pc:spChg>
-        <pc:spChg chg="add del mod">
-          <ac:chgData name="Schranzhofer Daniel Benjamin" userId="896aed5a-a90e-49ae-b044-096ef6952a5d" providerId="ADAL" clId="{62AFA320-9B9E-4927-8852-63FFD396E194}" dt="2024-12-17T07:45:33.009" v="670" actId="478"/>
-          <ac:spMkLst>
-            <pc:docMk/>
-            <pc:sldMk cId="2500380370" sldId="260"/>
-            <ac:spMk id="11" creationId="{4C533FCD-3711-CC8C-A2F9-2BD5210119CF}"/>
-          </ac:spMkLst>
-        </pc:spChg>
-        <pc:spChg chg="add del mod">
-          <ac:chgData name="Schranzhofer Daniel Benjamin" userId="896aed5a-a90e-49ae-b044-096ef6952a5d" providerId="ADAL" clId="{62AFA320-9B9E-4927-8852-63FFD396E194}" dt="2024-12-17T07:45:35.653" v="671" actId="478"/>
-          <ac:spMkLst>
-            <pc:docMk/>
-            <pc:sldMk cId="2500380370" sldId="260"/>
-            <ac:spMk id="13" creationId="{B54B029E-5D4B-4B32-9600-49B65A04F16F}"/>
-          </ac:spMkLst>
-        </pc:spChg>
-        <pc:spChg chg="add mod">
-          <ac:chgData name="Schranzhofer Daniel Benjamin" userId="896aed5a-a90e-49ae-b044-096ef6952a5d" providerId="ADAL" clId="{62AFA320-9B9E-4927-8852-63FFD396E194}" dt="2024-12-17T07:45:36.458" v="672"/>
-          <ac:spMkLst>
-            <pc:docMk/>
-            <pc:sldMk cId="2500380370" sldId="260"/>
-            <ac:spMk id="14" creationId="{A3C4E87F-6C57-776E-D414-F361ED65E477}"/>
-          </ac:spMkLst>
-        </pc:spChg>
-        <pc:spChg chg="add mod">
-          <ac:chgData name="Schranzhofer Daniel Benjamin" userId="896aed5a-a90e-49ae-b044-096ef6952a5d" providerId="ADAL" clId="{62AFA320-9B9E-4927-8852-63FFD396E194}" dt="2024-12-17T07:45:50.703" v="695" actId="20577"/>
-          <ac:spMkLst>
-            <pc:docMk/>
-            <pc:sldMk cId="2500380370" sldId="260"/>
-            <ac:spMk id="15" creationId="{C909CB2F-5E0B-AFE9-6073-4044D1DE43AA}"/>
-          </ac:spMkLst>
-        </pc:spChg>
-        <pc:spChg chg="add mod">
-          <ac:chgData name="Schranzhofer Daniel Benjamin" userId="896aed5a-a90e-49ae-b044-096ef6952a5d" providerId="ADAL" clId="{62AFA320-9B9E-4927-8852-63FFD396E194}" dt="2024-12-17T07:48:46.462" v="761" actId="20577"/>
-          <ac:spMkLst>
-            <pc:docMk/>
-            <pc:sldMk cId="2500380370" sldId="260"/>
-            <ac:spMk id="16" creationId="{D5C76C9B-2E3A-1CC2-FC51-9E760209AB52}"/>
-          </ac:spMkLst>
-        </pc:spChg>
-        <pc:spChg chg="add mod">
-          <ac:chgData name="Schranzhofer Daniel Benjamin" userId="896aed5a-a90e-49ae-b044-096ef6952a5d" providerId="ADAL" clId="{62AFA320-9B9E-4927-8852-63FFD396E194}" dt="2024-12-17T08:37:05.854" v="1547" actId="12"/>
-          <ac:spMkLst>
-            <pc:docMk/>
-            <pc:sldMk cId="2500380370" sldId="260"/>
-            <ac:spMk id="18" creationId="{F9ED096D-D4D2-AB3E-1E31-0DCDBDF8BA73}"/>
-          </ac:spMkLst>
-        </pc:spChg>
-        <pc:cxnChg chg="add del mod">
-          <ac:chgData name="Schranzhofer Daniel Benjamin" userId="896aed5a-a90e-49ae-b044-096ef6952a5d" providerId="ADAL" clId="{62AFA320-9B9E-4927-8852-63FFD396E194}" dt="2024-12-17T07:45:33.009" v="670" actId="478"/>
-          <ac:cxnSpMkLst>
-            <pc:docMk/>
-            <pc:sldMk cId="2500380370" sldId="260"/>
-            <ac:cxnSpMk id="10" creationId="{84AAB81A-2461-F1C6-5B18-FD8D083120DA}"/>
-          </ac:cxnSpMkLst>
-        </pc:cxnChg>
-        <pc:cxnChg chg="add mod">
-          <ac:chgData name="Schranzhofer Daniel Benjamin" userId="896aed5a-a90e-49ae-b044-096ef6952a5d" providerId="ADAL" clId="{62AFA320-9B9E-4927-8852-63FFD396E194}" dt="2024-12-17T07:45:36.458" v="672"/>
-          <ac:cxnSpMkLst>
-            <pc:docMk/>
-            <pc:sldMk cId="2500380370" sldId="260"/>
-            <ac:cxnSpMk id="17" creationId="{7E34CF4B-A292-B140-A900-D50EE8BEACE7}"/>
-          </ac:cxnSpMkLst>
-        </pc:cxnChg>
-      </pc:sldChg>
-      <pc:sldChg chg="modSp add del mod ord">
-        <pc:chgData name="Schranzhofer Daniel Benjamin" userId="896aed5a-a90e-49ae-b044-096ef6952a5d" providerId="ADAL" clId="{62AFA320-9B9E-4927-8852-63FFD396E194}" dt="2024-12-17T07:49:07.812" v="772" actId="2696"/>
-        <pc:sldMkLst>
-          <pc:docMk/>
-          <pc:sldMk cId="3530671909" sldId="261"/>
-        </pc:sldMkLst>
-        <pc:spChg chg="mod">
-          <ac:chgData name="Schranzhofer Daniel Benjamin" userId="896aed5a-a90e-49ae-b044-096ef6952a5d" providerId="ADAL" clId="{62AFA320-9B9E-4927-8852-63FFD396E194}" dt="2024-12-17T07:43:43.054" v="647" actId="113"/>
-          <ac:spMkLst>
-            <pc:docMk/>
-            <pc:sldMk cId="3530671909" sldId="261"/>
-            <ac:spMk id="5" creationId="{EBAB0FD6-7DC2-C77A-B94A-C35DCAB9AEB1}"/>
-          </ac:spMkLst>
-        </pc:spChg>
-        <pc:spChg chg="mod">
-          <ac:chgData name="Schranzhofer Daniel Benjamin" userId="896aed5a-a90e-49ae-b044-096ef6952a5d" providerId="ADAL" clId="{62AFA320-9B9E-4927-8852-63FFD396E194}" dt="2024-12-17T07:40:06.726" v="616" actId="20577"/>
-          <ac:spMkLst>
-            <pc:docMk/>
-            <pc:sldMk cId="3530671909" sldId="261"/>
-            <ac:spMk id="6" creationId="{AC1CFF33-B55E-EEE7-A582-2D90BA009423}"/>
-          </ac:spMkLst>
-        </pc:spChg>
-      </pc:sldChg>
-      <pc:sldChg chg="delSp add del ord setBg delDesignElem">
-        <pc:chgData name="Schranzhofer Daniel Benjamin" userId="896aed5a-a90e-49ae-b044-096ef6952a5d" providerId="ADAL" clId="{62AFA320-9B9E-4927-8852-63FFD396E194}" dt="2024-12-17T07:46:51.359" v="720" actId="2696"/>
-        <pc:sldMkLst>
-          <pc:docMk/>
-          <pc:sldMk cId="1847907401" sldId="262"/>
-        </pc:sldMkLst>
-        <pc:spChg chg="del">
-          <ac:chgData name="Schranzhofer Daniel Benjamin" userId="896aed5a-a90e-49ae-b044-096ef6952a5d" providerId="ADAL" clId="{62AFA320-9B9E-4927-8852-63FFD396E194}" dt="2024-12-17T07:45:14.598" v="662"/>
-          <ac:spMkLst>
-            <pc:docMk/>
-            <pc:sldMk cId="1847907401" sldId="262"/>
-            <ac:spMk id="10" creationId="{7AEE77D5-D0F6-D36B-6CCF-F01A133E136E}"/>
-          </ac:spMkLst>
-        </pc:spChg>
-        <pc:cxnChg chg="del">
-          <ac:chgData name="Schranzhofer Daniel Benjamin" userId="896aed5a-a90e-49ae-b044-096ef6952a5d" providerId="ADAL" clId="{62AFA320-9B9E-4927-8852-63FFD396E194}" dt="2024-12-17T07:45:14.598" v="662"/>
-          <ac:cxnSpMkLst>
-            <pc:docMk/>
-            <pc:sldMk cId="1847907401" sldId="262"/>
-            <ac:cxnSpMk id="12" creationId="{C1C5A346-BEBC-07A4-1EA9-C70D43EE47AF}"/>
-          </ac:cxnSpMkLst>
-        </pc:cxnChg>
-      </pc:sldChg>
-      <pc:sldChg chg="delSp add del setBg delDesignElem">
-        <pc:chgData name="Schranzhofer Daniel Benjamin" userId="896aed5a-a90e-49ae-b044-096ef6952a5d" providerId="ADAL" clId="{62AFA320-9B9E-4927-8852-63FFD396E194}" dt="2024-12-17T07:44:51.685" v="658" actId="2696"/>
-        <pc:sldMkLst>
-          <pc:docMk/>
-          <pc:sldMk cId="4058010848" sldId="262"/>
-        </pc:sldMkLst>
-        <pc:spChg chg="del">
-          <ac:chgData name="Schranzhofer Daniel Benjamin" userId="896aed5a-a90e-49ae-b044-096ef6952a5d" providerId="ADAL" clId="{62AFA320-9B9E-4927-8852-63FFD396E194}" dt="2024-12-17T07:44:45.850" v="657"/>
-          <ac:spMkLst>
-            <pc:docMk/>
-            <pc:sldMk cId="4058010848" sldId="262"/>
-            <ac:spMk id="10" creationId="{1D945535-EB8F-F0A4-E390-4CCA8B00703A}"/>
-          </ac:spMkLst>
-        </pc:spChg>
-        <pc:cxnChg chg="del">
-          <ac:chgData name="Schranzhofer Daniel Benjamin" userId="896aed5a-a90e-49ae-b044-096ef6952a5d" providerId="ADAL" clId="{62AFA320-9B9E-4927-8852-63FFD396E194}" dt="2024-12-17T07:44:45.850" v="657"/>
-          <ac:cxnSpMkLst>
-            <pc:docMk/>
-            <pc:sldMk cId="4058010848" sldId="262"/>
-            <ac:cxnSpMk id="12" creationId="{88625E6F-1D8A-3CFC-750F-59E73CD727B1}"/>
-          </ac:cxnSpMkLst>
-        </pc:cxnChg>
-      </pc:sldChg>
-      <pc:sldChg chg="addSp delSp modSp new mod ord modClrScheme chgLayout">
-        <pc:chgData name="Schranzhofer Daniel Benjamin" userId="896aed5a-a90e-49ae-b044-096ef6952a5d" providerId="ADAL" clId="{62AFA320-9B9E-4927-8852-63FFD396E194}" dt="2024-12-17T08:43:18.860" v="1771" actId="1076"/>
-        <pc:sldMkLst>
-          <pc:docMk/>
-          <pc:sldMk cId="2610884737" sldId="263"/>
-        </pc:sldMkLst>
-        <pc:spChg chg="del">
-          <ac:chgData name="Schranzhofer Daniel Benjamin" userId="896aed5a-a90e-49ae-b044-096ef6952a5d" providerId="ADAL" clId="{62AFA320-9B9E-4927-8852-63FFD396E194}" dt="2024-12-17T07:46:29.392" v="711" actId="700"/>
-          <ac:spMkLst>
-            <pc:docMk/>
-            <pc:sldMk cId="2610884737" sldId="263"/>
-            <ac:spMk id="2" creationId="{B829E570-3D3E-6973-57B3-C3F277F34A1E}"/>
-          </ac:spMkLst>
-        </pc:spChg>
-        <pc:spChg chg="del">
-          <ac:chgData name="Schranzhofer Daniel Benjamin" userId="896aed5a-a90e-49ae-b044-096ef6952a5d" providerId="ADAL" clId="{62AFA320-9B9E-4927-8852-63FFD396E194}" dt="2024-12-17T07:46:29.392" v="711" actId="700"/>
-          <ac:spMkLst>
-            <pc:docMk/>
-            <pc:sldMk cId="2610884737" sldId="263"/>
-            <ac:spMk id="3" creationId="{BB81A78F-8E52-4EEB-DD32-590CE7B6A5F9}"/>
-          </ac:spMkLst>
-        </pc:spChg>
-        <pc:spChg chg="add del mod">
-          <ac:chgData name="Schranzhofer Daniel Benjamin" userId="896aed5a-a90e-49ae-b044-096ef6952a5d" providerId="ADAL" clId="{62AFA320-9B9E-4927-8852-63FFD396E194}" dt="2024-12-17T07:55:04.916" v="795" actId="14100"/>
-          <ac:spMkLst>
-            <pc:docMk/>
-            <pc:sldMk cId="2610884737" sldId="263"/>
-            <ac:spMk id="4" creationId="{77E5C038-C919-680F-1F9D-1E85C868FEF1}"/>
-          </ac:spMkLst>
-        </pc:spChg>
-        <pc:spChg chg="add del mod">
-          <ac:chgData name="Schranzhofer Daniel Benjamin" userId="896aed5a-a90e-49ae-b044-096ef6952a5d" providerId="ADAL" clId="{62AFA320-9B9E-4927-8852-63FFD396E194}" dt="2024-12-17T07:55:04.916" v="795" actId="14100"/>
-          <ac:spMkLst>
-            <pc:docMk/>
-            <pc:sldMk cId="2610884737" sldId="263"/>
-            <ac:spMk id="5" creationId="{1322140A-AF04-86A9-21AF-5A7189C810CE}"/>
-          </ac:spMkLst>
-        </pc:spChg>
-        <pc:spChg chg="add del mod">
-          <ac:chgData name="Schranzhofer Daniel Benjamin" userId="896aed5a-a90e-49ae-b044-096ef6952a5d" providerId="ADAL" clId="{62AFA320-9B9E-4927-8852-63FFD396E194}" dt="2024-12-17T07:54:08.295" v="779" actId="478"/>
-          <ac:spMkLst>
-            <pc:docMk/>
-            <pc:sldMk cId="2610884737" sldId="263"/>
-            <ac:spMk id="6" creationId="{D60E2A8B-0649-B50D-9686-227CA86E7666}"/>
-          </ac:spMkLst>
-        </pc:spChg>
-        <pc:spChg chg="add del mod">
-          <ac:chgData name="Schranzhofer Daniel Benjamin" userId="896aed5a-a90e-49ae-b044-096ef6952a5d" providerId="ADAL" clId="{62AFA320-9B9E-4927-8852-63FFD396E194}" dt="2024-12-17T08:42:20.719" v="1712" actId="27636"/>
-          <ac:spMkLst>
-            <pc:docMk/>
-            <pc:sldMk cId="2610884737" sldId="263"/>
-            <ac:spMk id="8" creationId="{FB98F0C2-2352-D588-A51C-B6B2F63F8986}"/>
-          </ac:spMkLst>
-        </pc:spChg>
-        <pc:spChg chg="add mod">
-          <ac:chgData name="Schranzhofer Daniel Benjamin" userId="896aed5a-a90e-49ae-b044-096ef6952a5d" providerId="ADAL" clId="{62AFA320-9B9E-4927-8852-63FFD396E194}" dt="2024-12-17T08:43:18.860" v="1771" actId="1076"/>
-          <ac:spMkLst>
-            <pc:docMk/>
-            <pc:sldMk cId="2610884737" sldId="263"/>
-            <ac:spMk id="13" creationId="{539B70CF-1BA7-2B83-6DE5-68726A3078D0}"/>
-          </ac:spMkLst>
-        </pc:spChg>
-        <pc:cxnChg chg="add del mod">
-          <ac:chgData name="Schranzhofer Daniel Benjamin" userId="896aed5a-a90e-49ae-b044-096ef6952a5d" providerId="ADAL" clId="{62AFA320-9B9E-4927-8852-63FFD396E194}" dt="2024-12-17T07:55:04.916" v="795" actId="14100"/>
-          <ac:cxnSpMkLst>
-            <pc:docMk/>
-            <pc:sldMk cId="2610884737" sldId="263"/>
-            <ac:cxnSpMk id="7" creationId="{184A7C9E-E1C1-2C1D-D36E-8AF622416B83}"/>
-          </ac:cxnSpMkLst>
-        </pc:cxnChg>
-      </pc:sldChg>
-      <pc:sldChg chg="delSp add del setBg delDesignElem">
-        <pc:chgData name="Schranzhofer Daniel Benjamin" userId="896aed5a-a90e-49ae-b044-096ef6952a5d" providerId="ADAL" clId="{62AFA320-9B9E-4927-8852-63FFD396E194}" dt="2024-12-17T07:45:25.845" v="668" actId="47"/>
-        <pc:sldMkLst>
-          <pc:docMk/>
-          <pc:sldMk cId="3980766998" sldId="263"/>
-        </pc:sldMkLst>
-        <pc:spChg chg="del">
-          <ac:chgData name="Schranzhofer Daniel Benjamin" userId="896aed5a-a90e-49ae-b044-096ef6952a5d" providerId="ADAL" clId="{62AFA320-9B9E-4927-8852-63FFD396E194}" dt="2024-12-17T07:45:21.929" v="667"/>
-          <ac:spMkLst>
-            <pc:docMk/>
-            <pc:sldMk cId="3980766998" sldId="263"/>
-            <ac:spMk id="10" creationId="{0290E7EB-B647-1720-F7FA-B44D16CF8E6A}"/>
-          </ac:spMkLst>
-        </pc:spChg>
-        <pc:cxnChg chg="del">
-          <ac:chgData name="Schranzhofer Daniel Benjamin" userId="896aed5a-a90e-49ae-b044-096ef6952a5d" providerId="ADAL" clId="{62AFA320-9B9E-4927-8852-63FFD396E194}" dt="2024-12-17T07:45:21.929" v="667"/>
-          <ac:cxnSpMkLst>
-            <pc:docMk/>
-            <pc:sldMk cId="3980766998" sldId="263"/>
-            <ac:cxnSpMk id="12" creationId="{4F772141-5C03-2EC3-14BB-9AB14178634E}"/>
-          </ac:cxnSpMkLst>
-        </pc:cxnChg>
-      </pc:sldChg>
-      <pc:sldChg chg="new del">
-        <pc:chgData name="Schranzhofer Daniel Benjamin" userId="896aed5a-a90e-49ae-b044-096ef6952a5d" providerId="ADAL" clId="{62AFA320-9B9E-4927-8852-63FFD396E194}" dt="2024-12-17T08:29:41.023" v="1525" actId="47"/>
-        <pc:sldMkLst>
-          <pc:docMk/>
-          <pc:sldMk cId="2095769094" sldId="264"/>
-        </pc:sldMkLst>
-      </pc:sldChg>
-      <pc:sldChg chg="addSp delSp modSp new mod ord modClrScheme chgLayout">
-        <pc:chgData name="Schranzhofer Daniel Benjamin" userId="896aed5a-a90e-49ae-b044-096ef6952a5d" providerId="ADAL" clId="{62AFA320-9B9E-4927-8852-63FFD396E194}" dt="2024-12-17T08:29:37.796" v="1524"/>
-        <pc:sldMkLst>
-          <pc:docMk/>
-          <pc:sldMk cId="3791225581" sldId="265"/>
-        </pc:sldMkLst>
-        <pc:spChg chg="del">
-          <ac:chgData name="Schranzhofer Daniel Benjamin" userId="896aed5a-a90e-49ae-b044-096ef6952a5d" providerId="ADAL" clId="{62AFA320-9B9E-4927-8852-63FFD396E194}" dt="2024-12-17T08:11:25.864" v="843" actId="700"/>
-          <ac:spMkLst>
-            <pc:docMk/>
-            <pc:sldMk cId="3791225581" sldId="265"/>
-            <ac:spMk id="2" creationId="{5398C599-A83C-1503-94C4-F0194A380FD2}"/>
-          </ac:spMkLst>
-        </pc:spChg>
-        <pc:spChg chg="del">
-          <ac:chgData name="Schranzhofer Daniel Benjamin" userId="896aed5a-a90e-49ae-b044-096ef6952a5d" providerId="ADAL" clId="{62AFA320-9B9E-4927-8852-63FFD396E194}" dt="2024-12-17T08:11:25.864" v="843" actId="700"/>
-          <ac:spMkLst>
-            <pc:docMk/>
-            <pc:sldMk cId="3791225581" sldId="265"/>
-            <ac:spMk id="3" creationId="{5E86A1B3-0DD4-B6CB-3825-EC3EE26CA7DA}"/>
-          </ac:spMkLst>
-        </pc:spChg>
-        <pc:spChg chg="add mod">
-          <ac:chgData name="Schranzhofer Daniel Benjamin" userId="896aed5a-a90e-49ae-b044-096ef6952a5d" providerId="ADAL" clId="{62AFA320-9B9E-4927-8852-63FFD396E194}" dt="2024-12-17T08:11:26.314" v="844"/>
-          <ac:spMkLst>
-            <pc:docMk/>
-            <pc:sldMk cId="3791225581" sldId="265"/>
-            <ac:spMk id="4" creationId="{FAAF5FDC-CF01-E0B5-7DC8-64191E2A3A60}"/>
-          </ac:spMkLst>
-        </pc:spChg>
-        <pc:spChg chg="add mod">
-          <ac:chgData name="Schranzhofer Daniel Benjamin" userId="896aed5a-a90e-49ae-b044-096ef6952a5d" providerId="ADAL" clId="{62AFA320-9B9E-4927-8852-63FFD396E194}" dt="2024-12-17T08:17:13.271" v="959" actId="313"/>
-          <ac:spMkLst>
-            <pc:docMk/>
-            <pc:sldMk cId="3791225581" sldId="265"/>
-            <ac:spMk id="5" creationId="{C6FD9AE7-0439-967F-C46C-547786D0CDF0}"/>
-          </ac:spMkLst>
-        </pc:spChg>
-        <pc:spChg chg="add mod">
-          <ac:chgData name="Schranzhofer Daniel Benjamin" userId="896aed5a-a90e-49ae-b044-096ef6952a5d" providerId="ADAL" clId="{62AFA320-9B9E-4927-8852-63FFD396E194}" dt="2024-12-17T08:24:56.367" v="1522" actId="20577"/>
-          <ac:spMkLst>
-            <pc:docMk/>
-            <pc:sldMk cId="3791225581" sldId="265"/>
-            <ac:spMk id="7" creationId="{E7A2FAD0-A01E-29E8-A071-D8648FF93774}"/>
-          </ac:spMkLst>
-        </pc:spChg>
-        <pc:cxnChg chg="add mod">
-          <ac:chgData name="Schranzhofer Daniel Benjamin" userId="896aed5a-a90e-49ae-b044-096ef6952a5d" providerId="ADAL" clId="{62AFA320-9B9E-4927-8852-63FFD396E194}" dt="2024-12-17T08:11:26.314" v="844"/>
-          <ac:cxnSpMkLst>
-            <pc:docMk/>
-            <pc:sldMk cId="3791225581" sldId="265"/>
-            <ac:cxnSpMk id="6" creationId="{E9F7E56F-2A6F-FC0A-3084-AF6D63F5E4A7}"/>
-          </ac:cxnSpMkLst>
-        </pc:cxnChg>
-      </pc:sldChg>
-    </pc:docChg>
-  </pc:docChgLst>
-</pc:chgInfo>
 </file>
 
 <file path=ppt/slideLayouts/slideLayout1.xml><?xml version="1.0" encoding="utf-8"?>
@@ -969,7 +273,7 @@
           <a:p>
             <a:fld id="{909B4A3A-50F4-477C-A08F-9FEFB53D43FF}" type="datetimeFigureOut">
               <a:rPr lang="de-DE" smtClean="0"/>
-              <a:t>17.12.2024</a:t>
+              <a:t>17.12.24</a:t>
             </a:fld>
             <a:endParaRPr lang="de-DE"/>
           </a:p>
@@ -1167,7 +471,7 @@
           <a:p>
             <a:fld id="{909B4A3A-50F4-477C-A08F-9FEFB53D43FF}" type="datetimeFigureOut">
               <a:rPr lang="de-DE" smtClean="0"/>
-              <a:t>17.12.2024</a:t>
+              <a:t>17.12.24</a:t>
             </a:fld>
             <a:endParaRPr lang="de-DE"/>
           </a:p>
@@ -1375,7 +679,7 @@
           <a:p>
             <a:fld id="{909B4A3A-50F4-477C-A08F-9FEFB53D43FF}" type="datetimeFigureOut">
               <a:rPr lang="de-DE" smtClean="0"/>
-              <a:t>17.12.2024</a:t>
+              <a:t>17.12.24</a:t>
             </a:fld>
             <a:endParaRPr lang="de-DE"/>
           </a:p>
@@ -1573,7 +877,7 @@
           <a:p>
             <a:fld id="{909B4A3A-50F4-477C-A08F-9FEFB53D43FF}" type="datetimeFigureOut">
               <a:rPr lang="de-DE" smtClean="0"/>
-              <a:t>17.12.2024</a:t>
+              <a:t>17.12.24</a:t>
             </a:fld>
             <a:endParaRPr lang="de-DE"/>
           </a:p>
@@ -1848,7 +1152,7 @@
           <a:p>
             <a:fld id="{909B4A3A-50F4-477C-A08F-9FEFB53D43FF}" type="datetimeFigureOut">
               <a:rPr lang="de-DE" smtClean="0"/>
-              <a:t>17.12.2024</a:t>
+              <a:t>17.12.24</a:t>
             </a:fld>
             <a:endParaRPr lang="de-DE"/>
           </a:p>
@@ -2113,7 +1417,7 @@
           <a:p>
             <a:fld id="{909B4A3A-50F4-477C-A08F-9FEFB53D43FF}" type="datetimeFigureOut">
               <a:rPr lang="de-DE" smtClean="0"/>
-              <a:t>17.12.2024</a:t>
+              <a:t>17.12.24</a:t>
             </a:fld>
             <a:endParaRPr lang="de-DE"/>
           </a:p>
@@ -2525,7 +1829,7 @@
           <a:p>
             <a:fld id="{909B4A3A-50F4-477C-A08F-9FEFB53D43FF}" type="datetimeFigureOut">
               <a:rPr lang="de-DE" smtClean="0"/>
-              <a:t>17.12.2024</a:t>
+              <a:t>17.12.24</a:t>
             </a:fld>
             <a:endParaRPr lang="de-DE"/>
           </a:p>
@@ -2666,7 +1970,7 @@
           <a:p>
             <a:fld id="{909B4A3A-50F4-477C-A08F-9FEFB53D43FF}" type="datetimeFigureOut">
               <a:rPr lang="de-DE" smtClean="0"/>
-              <a:t>17.12.2024</a:t>
+              <a:t>17.12.24</a:t>
             </a:fld>
             <a:endParaRPr lang="de-DE"/>
           </a:p>
@@ -2779,7 +2083,7 @@
           <a:p>
             <a:fld id="{909B4A3A-50F4-477C-A08F-9FEFB53D43FF}" type="datetimeFigureOut">
               <a:rPr lang="de-DE" smtClean="0"/>
-              <a:t>17.12.2024</a:t>
+              <a:t>17.12.24</a:t>
             </a:fld>
             <a:endParaRPr lang="de-DE"/>
           </a:p>
@@ -3090,7 +2394,7 @@
           <a:p>
             <a:fld id="{909B4A3A-50F4-477C-A08F-9FEFB53D43FF}" type="datetimeFigureOut">
               <a:rPr lang="de-DE" smtClean="0"/>
-              <a:t>17.12.2024</a:t>
+              <a:t>17.12.24</a:t>
             </a:fld>
             <a:endParaRPr lang="de-DE"/>
           </a:p>
@@ -3378,7 +2682,7 @@
           <a:p>
             <a:fld id="{909B4A3A-50F4-477C-A08F-9FEFB53D43FF}" type="datetimeFigureOut">
               <a:rPr lang="de-DE" smtClean="0"/>
-              <a:t>17.12.2024</a:t>
+              <a:t>17.12.24</a:t>
             </a:fld>
             <a:endParaRPr lang="de-DE"/>
           </a:p>
@@ -3619,7 +2923,7 @@
           <a:p>
             <a:fld id="{909B4A3A-50F4-477C-A08F-9FEFB53D43FF}" type="datetimeFigureOut">
               <a:rPr lang="de-DE" smtClean="0"/>
-              <a:t>17.12.2024</a:t>
+              <a:t>17.12.24</a:t>
             </a:fld>
             <a:endParaRPr lang="de-DE"/>
           </a:p>
@@ -16219,6 +15523,14 @@
 <file path=ppt/slides/slide7.xml><?xml version="1.0" encoding="utf-8"?>
 <p:sld xmlns:a="http://schemas.openxmlformats.org/drawingml/2006/main" xmlns:r="http://schemas.openxmlformats.org/officeDocument/2006/relationships" xmlns:p="http://schemas.openxmlformats.org/presentationml/2006/main">
   <p:cSld>
+    <p:bg>
+      <p:bgPr>
+        <a:solidFill>
+          <a:schemeClr val="bg1"/>
+        </a:solidFill>
+        <a:effectLst/>
+      </p:bgPr>
+    </p:bg>
     <p:spTree>
       <p:nvGrpSpPr>
         <p:cNvPr id="1" name=""/>
@@ -16235,6 +15547,132 @@
       </p:grpSpPr>
       <p:sp>
         <p:nvSpPr>
+          <p:cNvPr id="10" name="Rectangle 9">
+            <a:extLst>
+              <a:ext uri="{FF2B5EF4-FFF2-40B4-BE49-F238E27FC236}">
+                <a16:creationId xmlns:a16="http://schemas.microsoft.com/office/drawing/2014/main" id="{6753252F-4873-4F63-801D-CC719279A7D5}"/>
+              </a:ext>
+              <a:ext uri="{C183D7F6-B498-43B3-948B-1728B52AA6E4}">
+                <adec:decorative xmlns:adec="http://schemas.microsoft.com/office/drawing/2017/decorative" val="1"/>
+              </a:ext>
+            </a:extLst>
+          </p:cNvPr>
+          <p:cNvSpPr>
+            <a:spLocks noGrp="1" noRot="1" noChangeAspect="1" noMove="1" noResize="1" noEditPoints="1" noAdjustHandles="1" noChangeArrowheads="1" noChangeShapeType="1" noTextEdit="1"/>
+          </p:cNvSpPr>
+          <p:nvPr>
+            <p:extLst>
+              <p:ext uri="{386F3935-93C4-4BCD-93E2-E3B085C9AB24}">
+                <p16:designElem xmlns:p16="http://schemas.microsoft.com/office/powerpoint/2015/main" val="1"/>
+              </p:ext>
+            </p:extLst>
+          </p:nvPr>
+        </p:nvSpPr>
+        <p:spPr>
+          <a:xfrm>
+            <a:off x="0" y="0"/>
+            <a:ext cx="12192000" cy="6858000"/>
+          </a:xfrm>
+          <a:prstGeom prst="rect">
+            <a:avLst/>
+          </a:prstGeom>
+          <a:solidFill>
+            <a:srgbClr val="FFFFFF"/>
+          </a:solidFill>
+          <a:ln>
+            <a:noFill/>
+          </a:ln>
+        </p:spPr>
+        <p:style>
+          <a:lnRef idx="2">
+            <a:schemeClr val="accent1">
+              <a:shade val="50000"/>
+            </a:schemeClr>
+          </a:lnRef>
+          <a:fillRef idx="1">
+            <a:schemeClr val="accent1"/>
+          </a:fillRef>
+          <a:effectRef idx="0">
+            <a:schemeClr val="accent1"/>
+          </a:effectRef>
+          <a:fontRef idx="minor">
+            <a:schemeClr val="lt1"/>
+          </a:fontRef>
+        </p:style>
+        <p:txBody>
+          <a:bodyPr rtlCol="0" anchor="ctr"/>
+          <a:lstStyle/>
+          <a:p>
+            <a:pPr algn="ctr"/>
+            <a:endParaRPr lang="en-US"/>
+          </a:p>
+        </p:txBody>
+      </p:sp>
+      <p:sp>
+        <p:nvSpPr>
+          <p:cNvPr id="12" name="Rectangle 11">
+            <a:extLst>
+              <a:ext uri="{FF2B5EF4-FFF2-40B4-BE49-F238E27FC236}">
+                <a16:creationId xmlns:a16="http://schemas.microsoft.com/office/drawing/2014/main" id="{047C8CCB-F95D-4249-92DD-651249D3535A}"/>
+              </a:ext>
+              <a:ext uri="{C183D7F6-B498-43B3-948B-1728B52AA6E4}">
+                <adec:decorative xmlns:adec="http://schemas.microsoft.com/office/drawing/2017/decorative" val="1"/>
+              </a:ext>
+            </a:extLst>
+          </p:cNvPr>
+          <p:cNvSpPr>
+            <a:spLocks noGrp="1" noRot="1" noChangeAspect="1" noMove="1" noResize="1" noEditPoints="1" noAdjustHandles="1" noChangeArrowheads="1" noChangeShapeType="1" noTextEdit="1"/>
+          </p:cNvSpPr>
+          <p:nvPr>
+            <p:extLst>
+              <p:ext uri="{386F3935-93C4-4BCD-93E2-E3B085C9AB24}">
+                <p16:designElem xmlns:p16="http://schemas.microsoft.com/office/powerpoint/2015/main" val="1"/>
+              </p:ext>
+            </p:extLst>
+          </p:nvPr>
+        </p:nvSpPr>
+        <p:spPr>
+          <a:xfrm>
+            <a:off x="0" y="0"/>
+            <a:ext cx="2013557" cy="6858000"/>
+          </a:xfrm>
+          <a:prstGeom prst="rect">
+            <a:avLst/>
+          </a:prstGeom>
+          <a:solidFill>
+            <a:srgbClr val="7F7F7F"/>
+          </a:solidFill>
+          <a:ln>
+            <a:noFill/>
+          </a:ln>
+        </p:spPr>
+        <p:style>
+          <a:lnRef idx="2">
+            <a:schemeClr val="accent1">
+              <a:shade val="50000"/>
+            </a:schemeClr>
+          </a:lnRef>
+          <a:fillRef idx="1">
+            <a:schemeClr val="accent1"/>
+          </a:fillRef>
+          <a:effectRef idx="0">
+            <a:schemeClr val="accent1"/>
+          </a:effectRef>
+          <a:fontRef idx="minor">
+            <a:schemeClr val="lt1"/>
+          </a:fontRef>
+        </p:style>
+        <p:txBody>
+          <a:bodyPr rtlCol="0" anchor="ctr"/>
+          <a:lstStyle/>
+          <a:p>
+            <a:pPr algn="ctr"/>
+            <a:endParaRPr lang="en-US"/>
+          </a:p>
+        </p:txBody>
+      </p:sp>
+      <p:sp>
+        <p:nvSpPr>
           <p:cNvPr id="2" name="Titel 1">
             <a:extLst>
               <a:ext uri="{FF2B5EF4-FFF2-40B4-BE49-F238E27FC236}">
@@ -16249,43 +15687,73 @@
             <p:ph type="title"/>
           </p:nvPr>
         </p:nvSpPr>
-        <p:spPr/>
+        <p:spPr>
+          <a:xfrm>
+            <a:off x="640080" y="2074363"/>
+            <a:ext cx="2752354" cy="2709275"/>
+          </a:xfrm>
+          <a:prstGeom prst="ellipse">
+            <a:avLst/>
+          </a:prstGeom>
+          <a:solidFill>
+            <a:srgbClr val="262626"/>
+          </a:solidFill>
+          <a:ln w="174625" cmpd="thinThick">
+            <a:solidFill>
+              <a:srgbClr val="262626"/>
+            </a:solidFill>
+          </a:ln>
+        </p:spPr>
         <p:txBody>
-          <a:bodyPr/>
+          <a:bodyPr vert="horz" lIns="91440" tIns="45720" rIns="91440" bIns="45720" rtlCol="0" anchor="ctr">
+            <a:normAutofit/>
+          </a:bodyPr>
           <a:lstStyle/>
           <a:p>
+            <a:pPr algn="ctr"/>
             <a:r>
-              <a:rPr lang="de-DE" b="1" dirty="0"/>
+              <a:rPr lang="en-US" sz="2000" b="1" kern="1200">
+                <a:solidFill>
+                  <a:srgbClr val="FFFFFF"/>
+                </a:solidFill>
+                <a:latin typeface="+mj-lt"/>
+                <a:ea typeface="+mj-ea"/>
+                <a:cs typeface="+mj-cs"/>
+              </a:rPr>
               <a:t>Blockschaltbild</a:t>
             </a:r>
           </a:p>
         </p:txBody>
       </p:sp>
-      <p:sp>
-        <p:nvSpPr>
-          <p:cNvPr id="3" name="Inhaltsplatzhalter 2">
+      <p:pic>
+        <p:nvPicPr>
+          <p:cNvPr id="5" name="Grafik 4">
             <a:extLst>
               <a:ext uri="{FF2B5EF4-FFF2-40B4-BE49-F238E27FC236}">
-                <a16:creationId xmlns:a16="http://schemas.microsoft.com/office/drawing/2014/main" id="{DB182687-3412-8E8A-EB79-0ABFBC6CA8F0}"/>
+                <a16:creationId xmlns:a16="http://schemas.microsoft.com/office/drawing/2014/main" id="{A0486A4E-2756-B40D-020B-AC4698F0FBAB}"/>
               </a:ext>
             </a:extLst>
           </p:cNvPr>
-          <p:cNvSpPr>
-            <a:spLocks noGrp="1"/>
-          </p:cNvSpPr>
-          <p:nvPr>
-            <p:ph idx="1"/>
-          </p:nvPr>
-        </p:nvSpPr>
-        <p:spPr/>
-        <p:txBody>
-          <a:bodyPr/>
-          <a:lstStyle/>
-          <a:p>
-            <a:endParaRPr lang="de-DE"/>
-          </a:p>
-        </p:txBody>
-      </p:sp>
+          <p:cNvPicPr>
+            <a:picLocks noChangeAspect="1"/>
+          </p:cNvPicPr>
+          <p:nvPr/>
+        </p:nvPicPr>
+        <p:blipFill>
+          <a:blip r:embed="rId2"/>
+          <a:srcRect l="7490" t="5779" r="16712" b="11423"/>
+          <a:stretch/>
+        </p:blipFill>
+        <p:spPr>
+          <a:xfrm>
+            <a:off x="3392434" y="502920"/>
+            <a:ext cx="8453119" cy="5852160"/>
+          </a:xfrm>
+          <a:prstGeom prst="rect">
+            <a:avLst/>
+          </a:prstGeom>
+        </p:spPr>
+      </p:pic>
     </p:spTree>
     <p:extLst>
       <p:ext uri="{BB962C8B-B14F-4D97-AF65-F5344CB8AC3E}">

</xml_diff>

<commit_message>
Add "Blockschaltbild" to Vorstellung
</commit_message>
<xml_diff>
--- a/Vorstellung.pptx
+++ b/Vorstellung.pptx
@@ -129,633 +129,6 @@
 </p1510:revInfo>
 </file>
 
-<file path=ppt/changesInfos/changesInfo1.xml><?xml version="1.0" encoding="utf-8"?>
-<pc:chgInfo xmlns:a="http://schemas.openxmlformats.org/drawingml/2006/main" xmlns:r="http://schemas.openxmlformats.org/officeDocument/2006/relationships" xmlns:ac="http://schemas.microsoft.com/office/drawing/2013/main/command" xmlns:pc="http://schemas.microsoft.com/office/powerpoint/2013/main/command">
-  <pc:docChgLst>
-    <pc:chgData name="Schranzhofer Daniel Benjamin" userId="896aed5a-a90e-49ae-b044-096ef6952a5d" providerId="ADAL" clId="{F285D1C5-361E-465F-986D-CAD6C187740B}"/>
-    <pc:docChg chg="undo custSel addSld delSld modSld sldOrd">
-      <pc:chgData name="Schranzhofer Daniel Benjamin" userId="896aed5a-a90e-49ae-b044-096ef6952a5d" providerId="ADAL" clId="{F285D1C5-361E-465F-986D-CAD6C187740B}" dt="2024-12-17T11:24:36.860" v="378" actId="478"/>
-      <pc:docMkLst>
-        <pc:docMk/>
-      </pc:docMkLst>
-      <pc:sldChg chg="modSp mod">
-        <pc:chgData name="Schranzhofer Daniel Benjamin" userId="896aed5a-a90e-49ae-b044-096ef6952a5d" providerId="ADAL" clId="{F285D1C5-361E-465F-986D-CAD6C187740B}" dt="2024-12-17T10:04:54.927" v="103" actId="790"/>
-        <pc:sldMkLst>
-          <pc:docMk/>
-          <pc:sldMk cId="61744048" sldId="256"/>
-        </pc:sldMkLst>
-        <pc:spChg chg="mod">
-          <ac:chgData name="Schranzhofer Daniel Benjamin" userId="896aed5a-a90e-49ae-b044-096ef6952a5d" providerId="ADAL" clId="{F285D1C5-361E-465F-986D-CAD6C187740B}" dt="2024-12-17T10:04:54.927" v="103" actId="790"/>
-          <ac:spMkLst>
-            <pc:docMk/>
-            <pc:sldMk cId="61744048" sldId="256"/>
-            <ac:spMk id="15" creationId="{7A31EF79-59DA-D68A-A542-0252D688B018}"/>
-          </ac:spMkLst>
-        </pc:spChg>
-        <pc:spChg chg="mod">
-          <ac:chgData name="Schranzhofer Daniel Benjamin" userId="896aed5a-a90e-49ae-b044-096ef6952a5d" providerId="ADAL" clId="{F285D1C5-361E-465F-986D-CAD6C187740B}" dt="2024-12-17T10:04:54.927" v="103" actId="790"/>
-          <ac:spMkLst>
-            <pc:docMk/>
-            <pc:sldMk cId="61744048" sldId="256"/>
-            <ac:spMk id="16" creationId="{26DAC35D-FA00-FB83-1572-CE21B0142A8C}"/>
-          </ac:spMkLst>
-        </pc:spChg>
-        <pc:spChg chg="mod">
-          <ac:chgData name="Schranzhofer Daniel Benjamin" userId="896aed5a-a90e-49ae-b044-096ef6952a5d" providerId="ADAL" clId="{F285D1C5-361E-465F-986D-CAD6C187740B}" dt="2024-12-17T10:04:54.927" v="103" actId="790"/>
-          <ac:spMkLst>
-            <pc:docMk/>
-            <pc:sldMk cId="61744048" sldId="256"/>
-            <ac:spMk id="17" creationId="{31F6B00F-72B9-3F4B-BC8C-8BBAB035F0B1}"/>
-          </ac:spMkLst>
-        </pc:spChg>
-        <pc:spChg chg="mod">
-          <ac:chgData name="Schranzhofer Daniel Benjamin" userId="896aed5a-a90e-49ae-b044-096ef6952a5d" providerId="ADAL" clId="{F285D1C5-361E-465F-986D-CAD6C187740B}" dt="2024-12-17T10:04:54.927" v="103" actId="790"/>
-          <ac:spMkLst>
-            <pc:docMk/>
-            <pc:sldMk cId="61744048" sldId="256"/>
-            <ac:spMk id="19" creationId="{961C55BD-6B58-EBB9-BCBB-080AE4A18C36}"/>
-          </ac:spMkLst>
-        </pc:spChg>
-      </pc:sldChg>
-      <pc:sldChg chg="modSp mod">
-        <pc:chgData name="Schranzhofer Daniel Benjamin" userId="896aed5a-a90e-49ae-b044-096ef6952a5d" providerId="ADAL" clId="{F285D1C5-361E-465F-986D-CAD6C187740B}" dt="2024-12-17T10:04:54.927" v="103" actId="790"/>
-        <pc:sldMkLst>
-          <pc:docMk/>
-          <pc:sldMk cId="1021443358" sldId="257"/>
-        </pc:sldMkLst>
-        <pc:spChg chg="mod">
-          <ac:chgData name="Schranzhofer Daniel Benjamin" userId="896aed5a-a90e-49ae-b044-096ef6952a5d" providerId="ADAL" clId="{F285D1C5-361E-465F-986D-CAD6C187740B}" dt="2024-12-17T10:04:54.927" v="103" actId="790"/>
-          <ac:spMkLst>
-            <pc:docMk/>
-            <pc:sldMk cId="1021443358" sldId="257"/>
-            <ac:spMk id="2" creationId="{3C4242E6-FB36-47B5-3312-2CF1F955B0B7}"/>
-          </ac:spMkLst>
-        </pc:spChg>
-        <pc:spChg chg="mod">
-          <ac:chgData name="Schranzhofer Daniel Benjamin" userId="896aed5a-a90e-49ae-b044-096ef6952a5d" providerId="ADAL" clId="{F285D1C5-361E-465F-986D-CAD6C187740B}" dt="2024-12-17T10:04:54.927" v="103" actId="790"/>
-          <ac:spMkLst>
-            <pc:docMk/>
-            <pc:sldMk cId="1021443358" sldId="257"/>
-            <ac:spMk id="14" creationId="{5A292AEA-2528-46C0-B426-95822B6141FB}"/>
-          </ac:spMkLst>
-        </pc:spChg>
-        <pc:spChg chg="mod">
-          <ac:chgData name="Schranzhofer Daniel Benjamin" userId="896aed5a-a90e-49ae-b044-096ef6952a5d" providerId="ADAL" clId="{F285D1C5-361E-465F-986D-CAD6C187740B}" dt="2024-12-17T10:04:54.927" v="103" actId="790"/>
-          <ac:spMkLst>
-            <pc:docMk/>
-            <pc:sldMk cId="1021443358" sldId="257"/>
-            <ac:spMk id="16" creationId="{D8B7B198-E4DF-43CD-AD8C-199884323745}"/>
-          </ac:spMkLst>
-        </pc:spChg>
-        <pc:spChg chg="mod">
-          <ac:chgData name="Schranzhofer Daniel Benjamin" userId="896aed5a-a90e-49ae-b044-096ef6952a5d" providerId="ADAL" clId="{F285D1C5-361E-465F-986D-CAD6C187740B}" dt="2024-12-17T10:04:54.927" v="103" actId="790"/>
-          <ac:spMkLst>
-            <pc:docMk/>
-            <pc:sldMk cId="1021443358" sldId="257"/>
-            <ac:spMk id="18" creationId="{2BE67753-EA0E-4819-8D22-0B6600CF7231}"/>
-          </ac:spMkLst>
-        </pc:spChg>
-        <pc:spChg chg="mod">
-          <ac:chgData name="Schranzhofer Daniel Benjamin" userId="896aed5a-a90e-49ae-b044-096ef6952a5d" providerId="ADAL" clId="{F285D1C5-361E-465F-986D-CAD6C187740B}" dt="2024-12-17T10:04:54.927" v="103" actId="790"/>
-          <ac:spMkLst>
-            <pc:docMk/>
-            <pc:sldMk cId="1021443358" sldId="257"/>
-            <ac:spMk id="21" creationId="{B997A32E-7032-4107-9C8B-99DB59EDD525}"/>
-          </ac:spMkLst>
-        </pc:spChg>
-        <pc:spChg chg="mod">
-          <ac:chgData name="Schranzhofer Daniel Benjamin" userId="896aed5a-a90e-49ae-b044-096ef6952a5d" providerId="ADAL" clId="{F285D1C5-361E-465F-986D-CAD6C187740B}" dt="2024-12-17T10:04:54.927" v="103" actId="790"/>
-          <ac:spMkLst>
-            <pc:docMk/>
-            <pc:sldMk cId="1021443358" sldId="257"/>
-            <ac:spMk id="22" creationId="{943BB27F-1470-42CA-91FF-D94BC691C8F2}"/>
-          </ac:spMkLst>
-        </pc:spChg>
-        <pc:spChg chg="mod">
-          <ac:chgData name="Schranzhofer Daniel Benjamin" userId="896aed5a-a90e-49ae-b044-096ef6952a5d" providerId="ADAL" clId="{F285D1C5-361E-465F-986D-CAD6C187740B}" dt="2024-12-17T10:04:54.927" v="103" actId="790"/>
-          <ac:spMkLst>
-            <pc:docMk/>
-            <pc:sldMk cId="1021443358" sldId="257"/>
-            <ac:spMk id="23" creationId="{E997B002-17FD-47B3-A06A-76802FE15CE7}"/>
-          </ac:spMkLst>
-        </pc:spChg>
-        <pc:spChg chg="mod">
-          <ac:chgData name="Schranzhofer Daniel Benjamin" userId="896aed5a-a90e-49ae-b044-096ef6952a5d" providerId="ADAL" clId="{F285D1C5-361E-465F-986D-CAD6C187740B}" dt="2024-12-17T10:04:54.927" v="103" actId="790"/>
-          <ac:spMkLst>
-            <pc:docMk/>
-            <pc:sldMk cId="1021443358" sldId="257"/>
-            <ac:spMk id="24" creationId="{E401EA35-9D2E-43B7-860F-EBB8A6C3E081}"/>
-          </ac:spMkLst>
-        </pc:spChg>
-        <pc:spChg chg="mod">
-          <ac:chgData name="Schranzhofer Daniel Benjamin" userId="896aed5a-a90e-49ae-b044-096ef6952a5d" providerId="ADAL" clId="{F285D1C5-361E-465F-986D-CAD6C187740B}" dt="2024-12-17T10:04:54.927" v="103" actId="790"/>
-          <ac:spMkLst>
-            <pc:docMk/>
-            <pc:sldMk cId="1021443358" sldId="257"/>
-            <ac:spMk id="25" creationId="{F8C44827-3D81-4FF9-B4A5-5650D1B20A29}"/>
-          </ac:spMkLst>
-        </pc:spChg>
-        <pc:spChg chg="mod">
-          <ac:chgData name="Schranzhofer Daniel Benjamin" userId="896aed5a-a90e-49ae-b044-096ef6952a5d" providerId="ADAL" clId="{F285D1C5-361E-465F-986D-CAD6C187740B}" dt="2024-12-17T10:04:54.927" v="103" actId="790"/>
-          <ac:spMkLst>
-            <pc:docMk/>
-            <pc:sldMk cId="1021443358" sldId="257"/>
-            <ac:spMk id="26" creationId="{F613D97F-F6DF-4D32-AD91-209A80E7A23C}"/>
-          </ac:spMkLst>
-        </pc:spChg>
-        <pc:spChg chg="mod">
-          <ac:chgData name="Schranzhofer Daniel Benjamin" userId="896aed5a-a90e-49ae-b044-096ef6952a5d" providerId="ADAL" clId="{F285D1C5-361E-465F-986D-CAD6C187740B}" dt="2024-12-17T10:04:54.927" v="103" actId="790"/>
-          <ac:spMkLst>
-            <pc:docMk/>
-            <pc:sldMk cId="1021443358" sldId="257"/>
-            <ac:spMk id="27" creationId="{82B0ED5C-927D-4C5F-8F27-1B403820B975}"/>
-          </ac:spMkLst>
-        </pc:spChg>
-        <pc:spChg chg="mod">
-          <ac:chgData name="Schranzhofer Daniel Benjamin" userId="896aed5a-a90e-49ae-b044-096ef6952a5d" providerId="ADAL" clId="{F285D1C5-361E-465F-986D-CAD6C187740B}" dt="2024-12-17T10:04:54.927" v="103" actId="790"/>
-          <ac:spMkLst>
-            <pc:docMk/>
-            <pc:sldMk cId="1021443358" sldId="257"/>
-            <ac:spMk id="30" creationId="{68B53067-4E48-4E71-A6A9-A8CAABAFBF69}"/>
-          </ac:spMkLst>
-        </pc:spChg>
-        <pc:spChg chg="mod">
-          <ac:chgData name="Schranzhofer Daniel Benjamin" userId="896aed5a-a90e-49ae-b044-096ef6952a5d" providerId="ADAL" clId="{F285D1C5-361E-465F-986D-CAD6C187740B}" dt="2024-12-17T10:04:54.927" v="103" actId="790"/>
-          <ac:spMkLst>
-            <pc:docMk/>
-            <pc:sldMk cId="1021443358" sldId="257"/>
-            <ac:spMk id="31" creationId="{06D1A0D3-4BB8-41D9-9CE7-2884C83F448B}"/>
-          </ac:spMkLst>
-        </pc:spChg>
-        <pc:spChg chg="mod">
-          <ac:chgData name="Schranzhofer Daniel Benjamin" userId="896aed5a-a90e-49ae-b044-096ef6952a5d" providerId="ADAL" clId="{F285D1C5-361E-465F-986D-CAD6C187740B}" dt="2024-12-17T10:04:54.927" v="103" actId="790"/>
-          <ac:spMkLst>
-            <pc:docMk/>
-            <pc:sldMk cId="1021443358" sldId="257"/>
-            <ac:spMk id="32" creationId="{81E20F06-3B09-4B89-A36B-AB8BFBCCA5D9}"/>
-          </ac:spMkLst>
-        </pc:spChg>
-        <pc:spChg chg="mod">
-          <ac:chgData name="Schranzhofer Daniel Benjamin" userId="896aed5a-a90e-49ae-b044-096ef6952a5d" providerId="ADAL" clId="{F285D1C5-361E-465F-986D-CAD6C187740B}" dt="2024-12-17T10:04:54.927" v="103" actId="790"/>
-          <ac:spMkLst>
-            <pc:docMk/>
-            <pc:sldMk cId="1021443358" sldId="257"/>
-            <ac:spMk id="33" creationId="{DAE6C3D7-7D5B-4926-877D-45F117BB6BF0}"/>
-          </ac:spMkLst>
-        </pc:spChg>
-        <pc:spChg chg="mod">
-          <ac:chgData name="Schranzhofer Daniel Benjamin" userId="896aed5a-a90e-49ae-b044-096ef6952a5d" providerId="ADAL" clId="{F285D1C5-361E-465F-986D-CAD6C187740B}" dt="2024-12-17T10:04:54.927" v="103" actId="790"/>
-          <ac:spMkLst>
-            <pc:docMk/>
-            <pc:sldMk cId="1021443358" sldId="257"/>
-            <ac:spMk id="36" creationId="{E1951533-A568-4765-AB1F-F71D9AFDEA9F}"/>
-          </ac:spMkLst>
-        </pc:spChg>
-        <pc:spChg chg="mod">
-          <ac:chgData name="Schranzhofer Daniel Benjamin" userId="896aed5a-a90e-49ae-b044-096ef6952a5d" providerId="ADAL" clId="{F285D1C5-361E-465F-986D-CAD6C187740B}" dt="2024-12-17T10:04:54.927" v="103" actId="790"/>
-          <ac:spMkLst>
-            <pc:docMk/>
-            <pc:sldMk cId="1021443358" sldId="257"/>
-            <ac:spMk id="37" creationId="{A7214F52-4F3F-4C96-A62E-F1401D6C04FA}"/>
-          </ac:spMkLst>
-        </pc:spChg>
-        <pc:spChg chg="mod">
-          <ac:chgData name="Schranzhofer Daniel Benjamin" userId="896aed5a-a90e-49ae-b044-096ef6952a5d" providerId="ADAL" clId="{F285D1C5-361E-465F-986D-CAD6C187740B}" dt="2024-12-17T10:04:54.927" v="103" actId="790"/>
-          <ac:spMkLst>
-            <pc:docMk/>
-            <pc:sldMk cId="1021443358" sldId="257"/>
-            <ac:spMk id="38" creationId="{023146A1-291C-4FA0-AB5B-EB04D4239812}"/>
-          </ac:spMkLst>
-        </pc:spChg>
-        <pc:spChg chg="mod">
-          <ac:chgData name="Schranzhofer Daniel Benjamin" userId="896aed5a-a90e-49ae-b044-096ef6952a5d" providerId="ADAL" clId="{F285D1C5-361E-465F-986D-CAD6C187740B}" dt="2024-12-17T10:04:54.927" v="103" actId="790"/>
-          <ac:spMkLst>
-            <pc:docMk/>
-            <pc:sldMk cId="1021443358" sldId="257"/>
-            <ac:spMk id="39" creationId="{62977932-2B03-4899-8306-5002CEE68E2C}"/>
-          </ac:spMkLst>
-        </pc:spChg>
-      </pc:sldChg>
-      <pc:sldChg chg="delSp modSp mod">
-        <pc:chgData name="Schranzhofer Daniel Benjamin" userId="896aed5a-a90e-49ae-b044-096ef6952a5d" providerId="ADAL" clId="{F285D1C5-361E-465F-986D-CAD6C187740B}" dt="2024-12-17T10:07:27.990" v="104" actId="478"/>
-        <pc:sldMkLst>
-          <pc:docMk/>
-          <pc:sldMk cId="1272570971" sldId="258"/>
-        </pc:sldMkLst>
-        <pc:spChg chg="mod">
-          <ac:chgData name="Schranzhofer Daniel Benjamin" userId="896aed5a-a90e-49ae-b044-096ef6952a5d" providerId="ADAL" clId="{F285D1C5-361E-465F-986D-CAD6C187740B}" dt="2024-12-17T10:04:54.927" v="103" actId="790"/>
-          <ac:spMkLst>
-            <pc:docMk/>
-            <pc:sldMk cId="1272570971" sldId="258"/>
-            <ac:spMk id="2" creationId="{77C0FBE6-3A73-32DF-055C-458B34C16060}"/>
-          </ac:spMkLst>
-        </pc:spChg>
-        <pc:spChg chg="del mod">
-          <ac:chgData name="Schranzhofer Daniel Benjamin" userId="896aed5a-a90e-49ae-b044-096ef6952a5d" providerId="ADAL" clId="{F285D1C5-361E-465F-986D-CAD6C187740B}" dt="2024-12-17T10:07:27.990" v="104" actId="478"/>
-          <ac:spMkLst>
-            <pc:docMk/>
-            <pc:sldMk cId="1272570971" sldId="258"/>
-            <ac:spMk id="3" creationId="{E9627B73-AD5A-D4AD-79E2-410C2663C736}"/>
-          </ac:spMkLst>
-        </pc:spChg>
-        <pc:spChg chg="mod">
-          <ac:chgData name="Schranzhofer Daniel Benjamin" userId="896aed5a-a90e-49ae-b044-096ef6952a5d" providerId="ADAL" clId="{F285D1C5-361E-465F-986D-CAD6C187740B}" dt="2024-12-17T10:04:54.927" v="103" actId="790"/>
-          <ac:spMkLst>
-            <pc:docMk/>
-            <pc:sldMk cId="1272570971" sldId="258"/>
-            <ac:spMk id="4" creationId="{69B80579-79A6-46E9-6667-09624969B3DA}"/>
-          </ac:spMkLst>
-        </pc:spChg>
-        <pc:spChg chg="mod">
-          <ac:chgData name="Schranzhofer Daniel Benjamin" userId="896aed5a-a90e-49ae-b044-096ef6952a5d" providerId="ADAL" clId="{F285D1C5-361E-465F-986D-CAD6C187740B}" dt="2024-12-17T10:04:54.927" v="103" actId="790"/>
-          <ac:spMkLst>
-            <pc:docMk/>
-            <pc:sldMk cId="1272570971" sldId="258"/>
-            <ac:spMk id="5" creationId="{D8DC8B67-1785-E6E1-D308-DCC85BFD665C}"/>
-          </ac:spMkLst>
-        </pc:spChg>
-        <pc:spChg chg="mod">
-          <ac:chgData name="Schranzhofer Daniel Benjamin" userId="896aed5a-a90e-49ae-b044-096ef6952a5d" providerId="ADAL" clId="{F285D1C5-361E-465F-986D-CAD6C187740B}" dt="2024-12-17T10:04:54.927" v="103" actId="790"/>
-          <ac:spMkLst>
-            <pc:docMk/>
-            <pc:sldMk cId="1272570971" sldId="258"/>
-            <ac:spMk id="10" creationId="{4C608BEB-860E-4094-8511-78603564A75E}"/>
-          </ac:spMkLst>
-        </pc:spChg>
-      </pc:sldChg>
-      <pc:sldChg chg="addSp delSp modSp mod ord">
-        <pc:chgData name="Schranzhofer Daniel Benjamin" userId="896aed5a-a90e-49ae-b044-096ef6952a5d" providerId="ADAL" clId="{F285D1C5-361E-465F-986D-CAD6C187740B}" dt="2024-12-17T10:04:54.927" v="103" actId="790"/>
-        <pc:sldMkLst>
-          <pc:docMk/>
-          <pc:sldMk cId="3495461466" sldId="259"/>
-        </pc:sldMkLst>
-        <pc:spChg chg="mod">
-          <ac:chgData name="Schranzhofer Daniel Benjamin" userId="896aed5a-a90e-49ae-b044-096ef6952a5d" providerId="ADAL" clId="{F285D1C5-361E-465F-986D-CAD6C187740B}" dt="2024-12-17T10:04:54.927" v="103" actId="790"/>
-          <ac:spMkLst>
-            <pc:docMk/>
-            <pc:sldMk cId="3495461466" sldId="259"/>
-            <ac:spMk id="2" creationId="{75CBCCD9-D2DF-DE01-EC57-3CEF21C37657}"/>
-          </ac:spMkLst>
-        </pc:spChg>
-        <pc:spChg chg="add del">
-          <ac:chgData name="Schranzhofer Daniel Benjamin" userId="896aed5a-a90e-49ae-b044-096ef6952a5d" providerId="ADAL" clId="{F285D1C5-361E-465F-986D-CAD6C187740B}" dt="2024-12-17T10:03:10.108" v="84" actId="22"/>
-          <ac:spMkLst>
-            <pc:docMk/>
-            <pc:sldMk cId="3495461466" sldId="259"/>
-            <ac:spMk id="4" creationId="{A9B9C816-B835-665E-B61D-6E3385258B4B}"/>
-          </ac:spMkLst>
-        </pc:spChg>
-        <pc:spChg chg="mod">
-          <ac:chgData name="Schranzhofer Daniel Benjamin" userId="896aed5a-a90e-49ae-b044-096ef6952a5d" providerId="ADAL" clId="{F285D1C5-361E-465F-986D-CAD6C187740B}" dt="2024-12-17T10:04:54.927" v="103" actId="790"/>
-          <ac:spMkLst>
-            <pc:docMk/>
-            <pc:sldMk cId="3495461466" sldId="259"/>
-            <ac:spMk id="10" creationId="{6753252F-4873-4F63-801D-CC719279A7D5}"/>
-          </ac:spMkLst>
-        </pc:spChg>
-        <pc:spChg chg="mod">
-          <ac:chgData name="Schranzhofer Daniel Benjamin" userId="896aed5a-a90e-49ae-b044-096ef6952a5d" providerId="ADAL" clId="{F285D1C5-361E-465F-986D-CAD6C187740B}" dt="2024-12-17T10:04:54.927" v="103" actId="790"/>
-          <ac:spMkLst>
-            <pc:docMk/>
-            <pc:sldMk cId="3495461466" sldId="259"/>
-            <ac:spMk id="12" creationId="{047C8CCB-F95D-4249-92DD-651249D3535A}"/>
-          </ac:spMkLst>
-        </pc:spChg>
-        <pc:picChg chg="del">
-          <ac:chgData name="Schranzhofer Daniel Benjamin" userId="896aed5a-a90e-49ae-b044-096ef6952a5d" providerId="ADAL" clId="{F285D1C5-361E-465F-986D-CAD6C187740B}" dt="2024-12-17T10:04:21.339" v="102" actId="478"/>
-          <ac:picMkLst>
-            <pc:docMk/>
-            <pc:sldMk cId="3495461466" sldId="259"/>
-            <ac:picMk id="5" creationId="{A0486A4E-2756-B40D-020B-AC4698F0FBAB}"/>
-          </ac:picMkLst>
-        </pc:picChg>
-      </pc:sldChg>
-      <pc:sldChg chg="modSp mod">
-        <pc:chgData name="Schranzhofer Daniel Benjamin" userId="896aed5a-a90e-49ae-b044-096ef6952a5d" providerId="ADAL" clId="{F285D1C5-361E-465F-986D-CAD6C187740B}" dt="2024-12-17T10:04:54.927" v="103" actId="790"/>
-        <pc:sldMkLst>
-          <pc:docMk/>
-          <pc:sldMk cId="2500380370" sldId="260"/>
-        </pc:sldMkLst>
-        <pc:spChg chg="mod">
-          <ac:chgData name="Schranzhofer Daniel Benjamin" userId="896aed5a-a90e-49ae-b044-096ef6952a5d" providerId="ADAL" clId="{F285D1C5-361E-465F-986D-CAD6C187740B}" dt="2024-12-17T10:04:54.927" v="103" actId="790"/>
-          <ac:spMkLst>
-            <pc:docMk/>
-            <pc:sldMk cId="2500380370" sldId="260"/>
-            <ac:spMk id="14" creationId="{A3C4E87F-6C57-776E-D414-F361ED65E477}"/>
-          </ac:spMkLst>
-        </pc:spChg>
-        <pc:spChg chg="mod">
-          <ac:chgData name="Schranzhofer Daniel Benjamin" userId="896aed5a-a90e-49ae-b044-096ef6952a5d" providerId="ADAL" clId="{F285D1C5-361E-465F-986D-CAD6C187740B}" dt="2024-12-17T10:04:54.927" v="103" actId="790"/>
-          <ac:spMkLst>
-            <pc:docMk/>
-            <pc:sldMk cId="2500380370" sldId="260"/>
-            <ac:spMk id="15" creationId="{C909CB2F-5E0B-AFE9-6073-4044D1DE43AA}"/>
-          </ac:spMkLst>
-        </pc:spChg>
-        <pc:spChg chg="mod">
-          <ac:chgData name="Schranzhofer Daniel Benjamin" userId="896aed5a-a90e-49ae-b044-096ef6952a5d" providerId="ADAL" clId="{F285D1C5-361E-465F-986D-CAD6C187740B}" dt="2024-12-17T10:04:54.927" v="103" actId="790"/>
-          <ac:spMkLst>
-            <pc:docMk/>
-            <pc:sldMk cId="2500380370" sldId="260"/>
-            <ac:spMk id="16" creationId="{D5C76C9B-2E3A-1CC2-FC51-9E760209AB52}"/>
-          </ac:spMkLst>
-        </pc:spChg>
-        <pc:spChg chg="mod">
-          <ac:chgData name="Schranzhofer Daniel Benjamin" userId="896aed5a-a90e-49ae-b044-096ef6952a5d" providerId="ADAL" clId="{F285D1C5-361E-465F-986D-CAD6C187740B}" dt="2024-12-17T10:04:54.927" v="103" actId="790"/>
-          <ac:spMkLst>
-            <pc:docMk/>
-            <pc:sldMk cId="2500380370" sldId="260"/>
-            <ac:spMk id="18" creationId="{F9ED096D-D4D2-AB3E-1E31-0DCDBDF8BA73}"/>
-          </ac:spMkLst>
-        </pc:spChg>
-      </pc:sldChg>
-      <pc:sldChg chg="modSp mod">
-        <pc:chgData name="Schranzhofer Daniel Benjamin" userId="896aed5a-a90e-49ae-b044-096ef6952a5d" providerId="ADAL" clId="{F285D1C5-361E-465F-986D-CAD6C187740B}" dt="2024-12-17T10:08:47.421" v="128" actId="14100"/>
-        <pc:sldMkLst>
-          <pc:docMk/>
-          <pc:sldMk cId="2610884737" sldId="263"/>
-        </pc:sldMkLst>
-        <pc:spChg chg="mod">
-          <ac:chgData name="Schranzhofer Daniel Benjamin" userId="896aed5a-a90e-49ae-b044-096ef6952a5d" providerId="ADAL" clId="{F285D1C5-361E-465F-986D-CAD6C187740B}" dt="2024-12-17T10:04:54.927" v="103" actId="790"/>
-          <ac:spMkLst>
-            <pc:docMk/>
-            <pc:sldMk cId="2610884737" sldId="263"/>
-            <ac:spMk id="4" creationId="{77E5C038-C919-680F-1F9D-1E85C868FEF1}"/>
-          </ac:spMkLst>
-        </pc:spChg>
-        <pc:spChg chg="mod">
-          <ac:chgData name="Schranzhofer Daniel Benjamin" userId="896aed5a-a90e-49ae-b044-096ef6952a5d" providerId="ADAL" clId="{F285D1C5-361E-465F-986D-CAD6C187740B}" dt="2024-12-17T10:04:54.927" v="103" actId="790"/>
-          <ac:spMkLst>
-            <pc:docMk/>
-            <pc:sldMk cId="2610884737" sldId="263"/>
-            <ac:spMk id="5" creationId="{1322140A-AF04-86A9-21AF-5A7189C810CE}"/>
-          </ac:spMkLst>
-        </pc:spChg>
-        <pc:spChg chg="mod">
-          <ac:chgData name="Schranzhofer Daniel Benjamin" userId="896aed5a-a90e-49ae-b044-096ef6952a5d" providerId="ADAL" clId="{F285D1C5-361E-465F-986D-CAD6C187740B}" dt="2024-12-17T10:08:47.421" v="128" actId="14100"/>
-          <ac:spMkLst>
-            <pc:docMk/>
-            <pc:sldMk cId="2610884737" sldId="263"/>
-            <ac:spMk id="8" creationId="{FB98F0C2-2352-D588-A51C-B6B2F63F8986}"/>
-          </ac:spMkLst>
-        </pc:spChg>
-        <pc:spChg chg="mod">
-          <ac:chgData name="Schranzhofer Daniel Benjamin" userId="896aed5a-a90e-49ae-b044-096ef6952a5d" providerId="ADAL" clId="{F285D1C5-361E-465F-986D-CAD6C187740B}" dt="2024-12-17T10:04:54.927" v="103" actId="790"/>
-          <ac:spMkLst>
-            <pc:docMk/>
-            <pc:sldMk cId="2610884737" sldId="263"/>
-            <ac:spMk id="13" creationId="{539B70CF-1BA7-2B83-6DE5-68726A3078D0}"/>
-          </ac:spMkLst>
-        </pc:spChg>
-      </pc:sldChg>
-      <pc:sldChg chg="modSp mod">
-        <pc:chgData name="Schranzhofer Daniel Benjamin" userId="896aed5a-a90e-49ae-b044-096ef6952a5d" providerId="ADAL" clId="{F285D1C5-361E-465F-986D-CAD6C187740B}" dt="2024-12-17T10:12:08.949" v="215" actId="20577"/>
-        <pc:sldMkLst>
-          <pc:docMk/>
-          <pc:sldMk cId="3791225581" sldId="265"/>
-        </pc:sldMkLst>
-        <pc:spChg chg="mod">
-          <ac:chgData name="Schranzhofer Daniel Benjamin" userId="896aed5a-a90e-49ae-b044-096ef6952a5d" providerId="ADAL" clId="{F285D1C5-361E-465F-986D-CAD6C187740B}" dt="2024-12-17T10:04:54.927" v="103" actId="790"/>
-          <ac:spMkLst>
-            <pc:docMk/>
-            <pc:sldMk cId="3791225581" sldId="265"/>
-            <ac:spMk id="4" creationId="{FAAF5FDC-CF01-E0B5-7DC8-64191E2A3A60}"/>
-          </ac:spMkLst>
-        </pc:spChg>
-        <pc:spChg chg="mod">
-          <ac:chgData name="Schranzhofer Daniel Benjamin" userId="896aed5a-a90e-49ae-b044-096ef6952a5d" providerId="ADAL" clId="{F285D1C5-361E-465F-986D-CAD6C187740B}" dt="2024-12-17T10:12:08.949" v="215" actId="20577"/>
-          <ac:spMkLst>
-            <pc:docMk/>
-            <pc:sldMk cId="3791225581" sldId="265"/>
-            <ac:spMk id="5" creationId="{C6FD9AE7-0439-967F-C46C-547786D0CDF0}"/>
-          </ac:spMkLst>
-        </pc:spChg>
-        <pc:spChg chg="mod">
-          <ac:chgData name="Schranzhofer Daniel Benjamin" userId="896aed5a-a90e-49ae-b044-096ef6952a5d" providerId="ADAL" clId="{F285D1C5-361E-465F-986D-CAD6C187740B}" dt="2024-12-17T10:04:54.927" v="103" actId="790"/>
-          <ac:spMkLst>
-            <pc:docMk/>
-            <pc:sldMk cId="3791225581" sldId="265"/>
-            <ac:spMk id="7" creationId="{E7A2FAD0-A01E-29E8-A071-D8648FF93774}"/>
-          </ac:spMkLst>
-        </pc:spChg>
-      </pc:sldChg>
-      <pc:sldChg chg="modSp del mod">
-        <pc:chgData name="Schranzhofer Daniel Benjamin" userId="896aed5a-a90e-49ae-b044-096ef6952a5d" providerId="ADAL" clId="{F285D1C5-361E-465F-986D-CAD6C187740B}" dt="2024-12-17T10:15:50.943" v="344" actId="2696"/>
-        <pc:sldMkLst>
-          <pc:docMk/>
-          <pc:sldMk cId="2206358031" sldId="266"/>
-        </pc:sldMkLst>
-        <pc:spChg chg="mod">
-          <ac:chgData name="Schranzhofer Daniel Benjamin" userId="896aed5a-a90e-49ae-b044-096ef6952a5d" providerId="ADAL" clId="{F285D1C5-361E-465F-986D-CAD6C187740B}" dt="2024-12-17T10:04:54.927" v="103" actId="790"/>
-          <ac:spMkLst>
-            <pc:docMk/>
-            <pc:sldMk cId="2206358031" sldId="266"/>
-            <ac:spMk id="2" creationId="{D60E8E75-EAE8-4B7C-BC77-B944EAC41998}"/>
-          </ac:spMkLst>
-        </pc:spChg>
-        <pc:spChg chg="mod">
-          <ac:chgData name="Schranzhofer Daniel Benjamin" userId="896aed5a-a90e-49ae-b044-096ef6952a5d" providerId="ADAL" clId="{F285D1C5-361E-465F-986D-CAD6C187740B}" dt="2024-12-17T10:04:54.927" v="103" actId="790"/>
-          <ac:spMkLst>
-            <pc:docMk/>
-            <pc:sldMk cId="2206358031" sldId="266"/>
-            <ac:spMk id="3" creationId="{CEEA0397-6373-A44A-3183-062C109C5E09}"/>
-          </ac:spMkLst>
-        </pc:spChg>
-        <pc:spChg chg="mod">
-          <ac:chgData name="Schranzhofer Daniel Benjamin" userId="896aed5a-a90e-49ae-b044-096ef6952a5d" providerId="ADAL" clId="{F285D1C5-361E-465F-986D-CAD6C187740B}" dt="2024-12-17T10:04:54.927" v="103" actId="790"/>
-          <ac:spMkLst>
-            <pc:docMk/>
-            <pc:sldMk cId="2206358031" sldId="266"/>
-            <ac:spMk id="10" creationId="{E35A04CF-97D4-4FF7-B359-C546B1F62E54}"/>
-          </ac:spMkLst>
-        </pc:spChg>
-        <pc:spChg chg="mod">
-          <ac:chgData name="Schranzhofer Daniel Benjamin" userId="896aed5a-a90e-49ae-b044-096ef6952a5d" providerId="ADAL" clId="{F285D1C5-361E-465F-986D-CAD6C187740B}" dt="2024-12-17T10:04:54.927" v="103" actId="790"/>
-          <ac:spMkLst>
-            <pc:docMk/>
-            <pc:sldMk cId="2206358031" sldId="266"/>
-            <ac:spMk id="12" creationId="{1DE7243B-5109-444B-8FAF-7437C66BC0E9}"/>
-          </ac:spMkLst>
-        </pc:spChg>
-        <pc:spChg chg="mod">
-          <ac:chgData name="Schranzhofer Daniel Benjamin" userId="896aed5a-a90e-49ae-b044-096ef6952a5d" providerId="ADAL" clId="{F285D1C5-361E-465F-986D-CAD6C187740B}" dt="2024-12-17T10:04:54.927" v="103" actId="790"/>
-          <ac:spMkLst>
-            <pc:docMk/>
-            <pc:sldMk cId="2206358031" sldId="266"/>
-            <ac:spMk id="14" creationId="{4C5D6221-DA7B-4611-AA26-7D8E349FDE96}"/>
-          </ac:spMkLst>
-        </pc:spChg>
-      </pc:sldChg>
-      <pc:sldChg chg="addSp delSp modSp new mod ord modClrScheme chgLayout">
-        <pc:chgData name="Schranzhofer Daniel Benjamin" userId="896aed5a-a90e-49ae-b044-096ef6952a5d" providerId="ADAL" clId="{F285D1C5-361E-465F-986D-CAD6C187740B}" dt="2024-12-17T11:24:36.860" v="378" actId="478"/>
-        <pc:sldMkLst>
-          <pc:docMk/>
-          <pc:sldMk cId="3608403467" sldId="267"/>
-        </pc:sldMkLst>
-        <pc:spChg chg="del">
-          <ac:chgData name="Schranzhofer Daniel Benjamin" userId="896aed5a-a90e-49ae-b044-096ef6952a5d" providerId="ADAL" clId="{F285D1C5-361E-465F-986D-CAD6C187740B}" dt="2024-12-17T10:03:16.482" v="86" actId="700"/>
-          <ac:spMkLst>
-            <pc:docMk/>
-            <pc:sldMk cId="3608403467" sldId="267"/>
-            <ac:spMk id="2" creationId="{A194FEE7-C4A0-E8D8-8B26-761AFDF20553}"/>
-          </ac:spMkLst>
-        </pc:spChg>
-        <pc:spChg chg="del">
-          <ac:chgData name="Schranzhofer Daniel Benjamin" userId="896aed5a-a90e-49ae-b044-096ef6952a5d" providerId="ADAL" clId="{F285D1C5-361E-465F-986D-CAD6C187740B}" dt="2024-12-17T10:03:16.482" v="86" actId="700"/>
-          <ac:spMkLst>
-            <pc:docMk/>
-            <pc:sldMk cId="3608403467" sldId="267"/>
-            <ac:spMk id="3" creationId="{4CDC247E-BDF1-20A3-2DAF-76787CDACB83}"/>
-          </ac:spMkLst>
-        </pc:spChg>
-        <pc:spChg chg="add mod">
-          <ac:chgData name="Schranzhofer Daniel Benjamin" userId="896aed5a-a90e-49ae-b044-096ef6952a5d" providerId="ADAL" clId="{F285D1C5-361E-465F-986D-CAD6C187740B}" dt="2024-12-17T10:04:54.927" v="103" actId="790"/>
-          <ac:spMkLst>
-            <pc:docMk/>
-            <pc:sldMk cId="3608403467" sldId="267"/>
-            <ac:spMk id="4" creationId="{3082BE1C-F9E0-7979-5571-F168D5B8C62A}"/>
-          </ac:spMkLst>
-        </pc:spChg>
-        <pc:spChg chg="add mod">
-          <ac:chgData name="Schranzhofer Daniel Benjamin" userId="896aed5a-a90e-49ae-b044-096ef6952a5d" providerId="ADAL" clId="{F285D1C5-361E-465F-986D-CAD6C187740B}" dt="2024-12-17T10:04:54.927" v="103" actId="790"/>
-          <ac:spMkLst>
-            <pc:docMk/>
-            <pc:sldMk cId="3608403467" sldId="267"/>
-            <ac:spMk id="5" creationId="{0D052B66-91DF-E73B-E565-5586234527EE}"/>
-          </ac:spMkLst>
-        </pc:spChg>
-        <pc:spChg chg="add mod">
-          <ac:chgData name="Schranzhofer Daniel Benjamin" userId="896aed5a-a90e-49ae-b044-096ef6952a5d" providerId="ADAL" clId="{F285D1C5-361E-465F-986D-CAD6C187740B}" dt="2024-12-17T10:04:54.927" v="103" actId="790"/>
-          <ac:spMkLst>
-            <pc:docMk/>
-            <pc:sldMk cId="3608403467" sldId="267"/>
-            <ac:spMk id="6" creationId="{1230AD92-5B5F-D54B-FB73-B9F4390B32CD}"/>
-          </ac:spMkLst>
-        </pc:spChg>
-        <pc:graphicFrameChg chg="add del mod">
-          <ac:chgData name="Schranzhofer Daniel Benjamin" userId="896aed5a-a90e-49ae-b044-096ef6952a5d" providerId="ADAL" clId="{F285D1C5-361E-465F-986D-CAD6C187740B}" dt="2024-12-17T11:24:36.860" v="378" actId="478"/>
-          <ac:graphicFrameMkLst>
-            <pc:docMk/>
-            <pc:sldMk cId="3608403467" sldId="267"/>
-            <ac:graphicFrameMk id="2" creationId="{04FA92D2-B5C6-C5AD-C98C-7F030AF53DAE}"/>
-          </ac:graphicFrameMkLst>
-        </pc:graphicFrameChg>
-        <pc:picChg chg="add del mod">
-          <ac:chgData name="Schranzhofer Daniel Benjamin" userId="896aed5a-a90e-49ae-b044-096ef6952a5d" providerId="ADAL" clId="{F285D1C5-361E-465F-986D-CAD6C187740B}" dt="2024-12-17T10:03:23.877" v="97" actId="478"/>
-          <ac:picMkLst>
-            <pc:docMk/>
-            <pc:sldMk cId="3608403467" sldId="267"/>
-            <ac:picMk id="7" creationId="{DABD408A-188D-73EC-4584-75BCC3B1511F}"/>
-          </ac:picMkLst>
-        </pc:picChg>
-      </pc:sldChg>
-      <pc:sldChg chg="addSp delSp modSp new del mod modClrScheme chgLayout">
-        <pc:chgData name="Schranzhofer Daniel Benjamin" userId="896aed5a-a90e-49ae-b044-096ef6952a5d" providerId="ADAL" clId="{F285D1C5-361E-465F-986D-CAD6C187740B}" dt="2024-12-17T10:15:40.870" v="343" actId="47"/>
-        <pc:sldMkLst>
-          <pc:docMk/>
-          <pc:sldMk cId="2811300541" sldId="268"/>
-        </pc:sldMkLst>
-        <pc:spChg chg="add del mod">
-          <ac:chgData name="Schranzhofer Daniel Benjamin" userId="896aed5a-a90e-49ae-b044-096ef6952a5d" providerId="ADAL" clId="{F285D1C5-361E-465F-986D-CAD6C187740B}" dt="2024-12-17T10:10:06.639" v="131" actId="478"/>
-          <ac:spMkLst>
-            <pc:docMk/>
-            <pc:sldMk cId="2811300541" sldId="268"/>
-            <ac:spMk id="2" creationId="{EE5AAF10-0BC2-A53A-E1C8-E032DF7DE67D}"/>
-          </ac:spMkLst>
-        </pc:spChg>
-        <pc:spChg chg="add del mod">
-          <ac:chgData name="Schranzhofer Daniel Benjamin" userId="896aed5a-a90e-49ae-b044-096ef6952a5d" providerId="ADAL" clId="{F285D1C5-361E-465F-986D-CAD6C187740B}" dt="2024-12-17T10:14:49.748" v="322" actId="21"/>
-          <ac:spMkLst>
-            <pc:docMk/>
-            <pc:sldMk cId="2811300541" sldId="268"/>
-            <ac:spMk id="3" creationId="{2CEB745C-8AD7-31A0-A4CC-BA83E78A166A}"/>
-          </ac:spMkLst>
-        </pc:spChg>
-        <pc:spChg chg="add del mod">
-          <ac:chgData name="Schranzhofer Daniel Benjamin" userId="896aed5a-a90e-49ae-b044-096ef6952a5d" providerId="ADAL" clId="{F285D1C5-361E-465F-986D-CAD6C187740B}" dt="2024-12-17T10:14:16.383" v="247" actId="21"/>
-          <ac:spMkLst>
-            <pc:docMk/>
-            <pc:sldMk cId="2811300541" sldId="268"/>
-            <ac:spMk id="4" creationId="{5F99C5C3-2029-E437-CEFD-37DF65AE1C22}"/>
-          </ac:spMkLst>
-        </pc:spChg>
-        <pc:spChg chg="add mod">
-          <ac:chgData name="Schranzhofer Daniel Benjamin" userId="896aed5a-a90e-49ae-b044-096ef6952a5d" providerId="ADAL" clId="{F285D1C5-361E-465F-986D-CAD6C187740B}" dt="2024-12-17T10:14:49.748" v="322" actId="21"/>
-          <ac:spMkLst>
-            <pc:docMk/>
-            <pc:sldMk cId="2811300541" sldId="268"/>
-            <ac:spMk id="6" creationId="{102E6A8D-E794-FEB8-2C72-23789C531D12}"/>
-          </ac:spMkLst>
-        </pc:spChg>
-      </pc:sldChg>
-      <pc:sldChg chg="addSp delSp modSp new mod">
-        <pc:chgData name="Schranzhofer Daniel Benjamin" userId="896aed5a-a90e-49ae-b044-096ef6952a5d" providerId="ADAL" clId="{F285D1C5-361E-465F-986D-CAD6C187740B}" dt="2024-12-17T10:16:42.823" v="376" actId="20577"/>
-        <pc:sldMkLst>
-          <pc:docMk/>
-          <pc:sldMk cId="2958476914" sldId="269"/>
-        </pc:sldMkLst>
-        <pc:spChg chg="add mod">
-          <ac:chgData name="Schranzhofer Daniel Benjamin" userId="896aed5a-a90e-49ae-b044-096ef6952a5d" providerId="ADAL" clId="{F285D1C5-361E-465F-986D-CAD6C187740B}" dt="2024-12-17T10:14:07.619" v="244"/>
-          <ac:spMkLst>
-            <pc:docMk/>
-            <pc:sldMk cId="2958476914" sldId="269"/>
-            <ac:spMk id="2" creationId="{527A7A93-C50F-D2B7-8F44-B39B2F161A37}"/>
-          </ac:spMkLst>
-        </pc:spChg>
-        <pc:spChg chg="add mod">
-          <ac:chgData name="Schranzhofer Daniel Benjamin" userId="896aed5a-a90e-49ae-b044-096ef6952a5d" providerId="ADAL" clId="{F285D1C5-361E-465F-986D-CAD6C187740B}" dt="2024-12-17T10:14:07.619" v="244"/>
-          <ac:spMkLst>
-            <pc:docMk/>
-            <pc:sldMk cId="2958476914" sldId="269"/>
-            <ac:spMk id="3" creationId="{CB3DD32B-773B-3004-D4A9-9A74FD8EB78C}"/>
-          </ac:spMkLst>
-        </pc:spChg>
-        <pc:spChg chg="add del mod">
-          <ac:chgData name="Schranzhofer Daniel Benjamin" userId="896aed5a-a90e-49ae-b044-096ef6952a5d" providerId="ADAL" clId="{F285D1C5-361E-465F-986D-CAD6C187740B}" dt="2024-12-17T10:14:10.523" v="245" actId="478"/>
-          <ac:spMkLst>
-            <pc:docMk/>
-            <pc:sldMk cId="2958476914" sldId="269"/>
-            <ac:spMk id="5" creationId="{0EC0FC5C-A3DC-ECED-826F-D95FC210B027}"/>
-          </ac:spMkLst>
-        </pc:spChg>
-        <pc:spChg chg="add del mod">
-          <ac:chgData name="Schranzhofer Daniel Benjamin" userId="896aed5a-a90e-49ae-b044-096ef6952a5d" providerId="ADAL" clId="{F285D1C5-361E-465F-986D-CAD6C187740B}" dt="2024-12-17T10:14:11.865" v="246" actId="478"/>
-          <ac:spMkLst>
-            <pc:docMk/>
-            <pc:sldMk cId="2958476914" sldId="269"/>
-            <ac:spMk id="6" creationId="{60FCB94A-323F-FE78-743B-2D4AD8221141}"/>
-          </ac:spMkLst>
-        </pc:spChg>
-        <pc:spChg chg="add mod">
-          <ac:chgData name="Schranzhofer Daniel Benjamin" userId="896aed5a-a90e-49ae-b044-096ef6952a5d" providerId="ADAL" clId="{F285D1C5-361E-465F-986D-CAD6C187740B}" dt="2024-12-17T10:16:42.823" v="376" actId="20577"/>
-          <ac:spMkLst>
-            <pc:docMk/>
-            <pc:sldMk cId="2958476914" sldId="269"/>
-            <ac:spMk id="7" creationId="{5F99C5C3-2029-E437-CEFD-37DF65AE1C22}"/>
-          </ac:spMkLst>
-        </pc:spChg>
-        <pc:spChg chg="add mod">
-          <ac:chgData name="Schranzhofer Daniel Benjamin" userId="896aed5a-a90e-49ae-b044-096ef6952a5d" providerId="ADAL" clId="{F285D1C5-361E-465F-986D-CAD6C187740B}" dt="2024-12-17T10:15:24.465" v="340" actId="113"/>
-          <ac:spMkLst>
-            <pc:docMk/>
-            <pc:sldMk cId="2958476914" sldId="269"/>
-            <ac:spMk id="8" creationId="{2CEB745C-8AD7-31A0-A4CC-BA83E78A166A}"/>
-          </ac:spMkLst>
-        </pc:spChg>
-        <pc:cxnChg chg="add mod">
-          <ac:chgData name="Schranzhofer Daniel Benjamin" userId="896aed5a-a90e-49ae-b044-096ef6952a5d" providerId="ADAL" clId="{F285D1C5-361E-465F-986D-CAD6C187740B}" dt="2024-12-17T10:14:07.619" v="244"/>
-          <ac:cxnSpMkLst>
-            <pc:docMk/>
-            <pc:sldMk cId="2958476914" sldId="269"/>
-            <ac:cxnSpMk id="4" creationId="{18E2F1B2-E1F9-A7B3-24D9-9A28C89170B8}"/>
-          </ac:cxnSpMkLst>
-        </pc:cxnChg>
-      </pc:sldChg>
-    </pc:docChg>
-  </pc:docChgLst>
-</pc:chgInfo>
-</file>
-
 <file path=ppt/slideLayouts/slideLayout1.xml><?xml version="1.0" encoding="utf-8"?>
 <p:sldLayout xmlns:a="http://schemas.openxmlformats.org/drawingml/2006/main" xmlns:r="http://schemas.openxmlformats.org/officeDocument/2006/relationships" xmlns:p="http://schemas.openxmlformats.org/presentationml/2006/main" type="title" preserve="1">
   <p:cSld name="Titelfolie">
@@ -903,7 +276,7 @@
           <a:p>
             <a:fld id="{909B4A3A-50F4-477C-A08F-9FEFB53D43FF}" type="datetimeFigureOut">
               <a:rPr lang="de-DE" smtClean="0"/>
-              <a:t>17.12.2024</a:t>
+              <a:t>17.12.24</a:t>
             </a:fld>
             <a:endParaRPr lang="de-DE"/>
           </a:p>
@@ -1101,7 +474,7 @@
           <a:p>
             <a:fld id="{909B4A3A-50F4-477C-A08F-9FEFB53D43FF}" type="datetimeFigureOut">
               <a:rPr lang="de-DE" smtClean="0"/>
-              <a:t>17.12.2024</a:t>
+              <a:t>17.12.24</a:t>
             </a:fld>
             <a:endParaRPr lang="de-DE"/>
           </a:p>
@@ -1309,7 +682,7 @@
           <a:p>
             <a:fld id="{909B4A3A-50F4-477C-A08F-9FEFB53D43FF}" type="datetimeFigureOut">
               <a:rPr lang="de-DE" smtClean="0"/>
-              <a:t>17.12.2024</a:t>
+              <a:t>17.12.24</a:t>
             </a:fld>
             <a:endParaRPr lang="de-DE"/>
           </a:p>
@@ -1507,7 +880,7 @@
           <a:p>
             <a:fld id="{909B4A3A-50F4-477C-A08F-9FEFB53D43FF}" type="datetimeFigureOut">
               <a:rPr lang="de-DE" smtClean="0"/>
-              <a:t>17.12.2024</a:t>
+              <a:t>17.12.24</a:t>
             </a:fld>
             <a:endParaRPr lang="de-DE"/>
           </a:p>
@@ -1782,7 +1155,7 @@
           <a:p>
             <a:fld id="{909B4A3A-50F4-477C-A08F-9FEFB53D43FF}" type="datetimeFigureOut">
               <a:rPr lang="de-DE" smtClean="0"/>
-              <a:t>17.12.2024</a:t>
+              <a:t>17.12.24</a:t>
             </a:fld>
             <a:endParaRPr lang="de-DE"/>
           </a:p>
@@ -2047,7 +1420,7 @@
           <a:p>
             <a:fld id="{909B4A3A-50F4-477C-A08F-9FEFB53D43FF}" type="datetimeFigureOut">
               <a:rPr lang="de-DE" smtClean="0"/>
-              <a:t>17.12.2024</a:t>
+              <a:t>17.12.24</a:t>
             </a:fld>
             <a:endParaRPr lang="de-DE"/>
           </a:p>
@@ -2459,7 +1832,7 @@
           <a:p>
             <a:fld id="{909B4A3A-50F4-477C-A08F-9FEFB53D43FF}" type="datetimeFigureOut">
               <a:rPr lang="de-DE" smtClean="0"/>
-              <a:t>17.12.2024</a:t>
+              <a:t>17.12.24</a:t>
             </a:fld>
             <a:endParaRPr lang="de-DE"/>
           </a:p>
@@ -2600,7 +1973,7 @@
           <a:p>
             <a:fld id="{909B4A3A-50F4-477C-A08F-9FEFB53D43FF}" type="datetimeFigureOut">
               <a:rPr lang="de-DE" smtClean="0"/>
-              <a:t>17.12.2024</a:t>
+              <a:t>17.12.24</a:t>
             </a:fld>
             <a:endParaRPr lang="de-DE"/>
           </a:p>
@@ -2713,7 +2086,7 @@
           <a:p>
             <a:fld id="{909B4A3A-50F4-477C-A08F-9FEFB53D43FF}" type="datetimeFigureOut">
               <a:rPr lang="de-DE" smtClean="0"/>
-              <a:t>17.12.2024</a:t>
+              <a:t>17.12.24</a:t>
             </a:fld>
             <a:endParaRPr lang="de-DE"/>
           </a:p>
@@ -3024,7 +2397,7 @@
           <a:p>
             <a:fld id="{909B4A3A-50F4-477C-A08F-9FEFB53D43FF}" type="datetimeFigureOut">
               <a:rPr lang="de-DE" smtClean="0"/>
-              <a:t>17.12.2024</a:t>
+              <a:t>17.12.24</a:t>
             </a:fld>
             <a:endParaRPr lang="de-DE"/>
           </a:p>
@@ -3312,7 +2685,7 @@
           <a:p>
             <a:fld id="{909B4A3A-50F4-477C-A08F-9FEFB53D43FF}" type="datetimeFigureOut">
               <a:rPr lang="de-DE" smtClean="0"/>
-              <a:t>17.12.2024</a:t>
+              <a:t>17.12.24</a:t>
             </a:fld>
             <a:endParaRPr lang="de-DE"/>
           </a:p>
@@ -3553,7 +2926,7 @@
           <a:p>
             <a:fld id="{909B4A3A-50F4-477C-A08F-9FEFB53D43FF}" type="datetimeFigureOut">
               <a:rPr lang="de-DE" smtClean="0"/>
-              <a:t>17.12.2024</a:t>
+              <a:t>17.12.24</a:t>
             </a:fld>
             <a:endParaRPr lang="de-DE"/>
           </a:p>
@@ -13576,6 +12949,35 @@
           </a:p>
         </p:txBody>
       </p:sp>
+      <p:pic>
+        <p:nvPicPr>
+          <p:cNvPr id="3" name="Grafik 2">
+            <a:extLst>
+              <a:ext uri="{FF2B5EF4-FFF2-40B4-BE49-F238E27FC236}">
+                <a16:creationId xmlns:a16="http://schemas.microsoft.com/office/drawing/2014/main" id="{42658B27-AA26-820A-871F-7B8A8FA36981}"/>
+              </a:ext>
+            </a:extLst>
+          </p:cNvPr>
+          <p:cNvPicPr>
+            <a:picLocks noChangeAspect="1"/>
+          </p:cNvPicPr>
+          <p:nvPr/>
+        </p:nvPicPr>
+        <p:blipFill>
+          <a:blip r:embed="rId2"/>
+          <a:srcRect l="9804" t="13607" r="31884" b="24075"/>
+          <a:stretch/>
+        </p:blipFill>
+        <p:spPr>
+          <a:xfrm>
+            <a:off x="3604593" y="438635"/>
+            <a:ext cx="8084621" cy="5980729"/>
+          </a:xfrm>
+          <a:prstGeom prst="rect">
+            <a:avLst/>
+          </a:prstGeom>
+        </p:spPr>
+      </p:pic>
     </p:spTree>
     <p:extLst>
       <p:ext uri="{BB962C8B-B14F-4D97-AF65-F5344CB8AC3E}">
@@ -13815,6 +13217,35 @@
           </a:p>
         </p:txBody>
       </p:sp>
+      <p:pic>
+        <p:nvPicPr>
+          <p:cNvPr id="6" name="Grafik 5">
+            <a:extLst>
+              <a:ext uri="{FF2B5EF4-FFF2-40B4-BE49-F238E27FC236}">
+                <a16:creationId xmlns:a16="http://schemas.microsoft.com/office/drawing/2014/main" id="{83B2813C-9DC7-B0E8-01CE-59003675744B}"/>
+              </a:ext>
+            </a:extLst>
+          </p:cNvPr>
+          <p:cNvPicPr>
+            <a:picLocks noChangeAspect="1"/>
+          </p:cNvPicPr>
+          <p:nvPr/>
+        </p:nvPicPr>
+        <p:blipFill>
+          <a:blip r:embed="rId2"/>
+          <a:srcRect l="11294" t="10322" r="13855" b="9206"/>
+          <a:stretch/>
+        </p:blipFill>
+        <p:spPr>
+          <a:xfrm>
+            <a:off x="3101118" y="241851"/>
+            <a:ext cx="8827495" cy="6374295"/>
+          </a:xfrm>
+          <a:prstGeom prst="rect">
+            <a:avLst/>
+          </a:prstGeom>
+        </p:spPr>
+      </p:pic>
     </p:spTree>
     <p:extLst>
       <p:ext uri="{BB962C8B-B14F-4D97-AF65-F5344CB8AC3E}">

</xml_diff>